<commit_message>
multiprocessing was checked on CC
</commit_message>
<xml_diff>
--- a/Manuscripts/Presentation - Deepfeatures.pptx
+++ b/Manuscripts/Presentation - Deepfeatures.pptx
@@ -5,20 +5,23 @@
     <p:sldMasterId id="2147483648" r:id="rId4"/>
   </p:sldMasterIdLst>
   <p:notesMasterIdLst>
-    <p:notesMasterId r:id="rId16"/>
+    <p:notesMasterId r:id="rId19"/>
   </p:notesMasterIdLst>
   <p:sldIdLst>
     <p:sldId id="256" r:id="rId5"/>
     <p:sldId id="270" r:id="rId6"/>
-    <p:sldId id="285" r:id="rId7"/>
-    <p:sldId id="336" r:id="rId8"/>
-    <p:sldId id="309" r:id="rId9"/>
-    <p:sldId id="330" r:id="rId10"/>
-    <p:sldId id="277" r:id="rId11"/>
+    <p:sldId id="341" r:id="rId7"/>
+    <p:sldId id="285" r:id="rId8"/>
+    <p:sldId id="336" r:id="rId9"/>
+    <p:sldId id="309" r:id="rId10"/>
+    <p:sldId id="330" r:id="rId11"/>
     <p:sldId id="278" r:id="rId12"/>
-    <p:sldId id="279" r:id="rId13"/>
-    <p:sldId id="280" r:id="rId14"/>
-    <p:sldId id="313" r:id="rId15"/>
+    <p:sldId id="337" r:id="rId13"/>
+    <p:sldId id="338" r:id="rId14"/>
+    <p:sldId id="339" r:id="rId15"/>
+    <p:sldId id="340" r:id="rId16"/>
+    <p:sldId id="277" r:id="rId17"/>
+    <p:sldId id="313" r:id="rId18"/>
   </p:sldIdLst>
   <p:sldSz cx="12192000" cy="6858000"/>
   <p:notesSz cx="6858000" cy="9144000"/>
@@ -1289,6 +1292,100 @@
         </a:p>
       </dgm:t>
     </dgm:pt>
+    <dgm:pt modelId="{31D1216E-C91E-4893-9BF3-20BB0BF21907}">
+      <dgm:prSet phldrT="[Text]" custT="1"/>
+      <dgm:spPr/>
+      <dgm:t>
+        <a:bodyPr/>
+        <a:lstStyle/>
+        <a:p>
+          <a:r>
+            <a:rPr lang="en-US" sz="1400" b="1" kern="1200" dirty="0">
+              <a:solidFill>
+                <a:prstClr val="white"/>
+              </a:solidFill>
+              <a:latin typeface="Segoe "/>
+              <a:ea typeface="+mn-ea"/>
+              <a:cs typeface="+mn-cs"/>
+            </a:rPr>
+            <a:t>Resnet50</a:t>
+          </a:r>
+        </a:p>
+      </dgm:t>
+    </dgm:pt>
+    <dgm:pt modelId="{C1C1FC31-55D7-44B3-BA60-02893AB87129}" type="parTrans" cxnId="{6D0B7977-7484-47F5-91F5-7D2EF86CDD89}">
+      <dgm:prSet/>
+      <dgm:spPr/>
+      <dgm:t>
+        <a:bodyPr/>
+        <a:lstStyle/>
+        <a:p>
+          <a:endParaRPr lang="en-US"/>
+        </a:p>
+      </dgm:t>
+    </dgm:pt>
+    <dgm:pt modelId="{E59AA517-E02F-4F4D-8785-33958331F080}" type="sibTrans" cxnId="{6D0B7977-7484-47F5-91F5-7D2EF86CDD89}">
+      <dgm:prSet/>
+      <dgm:spPr/>
+      <dgm:t>
+        <a:bodyPr/>
+        <a:lstStyle/>
+        <a:p>
+          <a:endParaRPr lang="en-US"/>
+        </a:p>
+      </dgm:t>
+    </dgm:pt>
+    <dgm:pt modelId="{695119D0-0D83-4718-84A4-FFE1912513CA}">
+      <dgm:prSet phldrT="[Text]" custT="1"/>
+      <dgm:spPr/>
+      <dgm:t>
+        <a:bodyPr/>
+        <a:lstStyle/>
+        <a:p>
+          <a:r>
+            <a:rPr lang="en-US" sz="1400" b="1" kern="1200" dirty="0" err="1">
+              <a:solidFill>
+                <a:prstClr val="white"/>
+              </a:solidFill>
+              <a:latin typeface="Segoe "/>
+              <a:ea typeface="+mn-ea"/>
+              <a:cs typeface="+mn-cs"/>
+            </a:rPr>
+            <a:t>mobilenet</a:t>
+          </a:r>
+          <a:endParaRPr lang="en-US" sz="1400" b="1" kern="1200" dirty="0">
+            <a:solidFill>
+              <a:prstClr val="white"/>
+            </a:solidFill>
+            <a:latin typeface="Segoe "/>
+            <a:ea typeface="+mn-ea"/>
+            <a:cs typeface="+mn-cs"/>
+          </a:endParaRPr>
+        </a:p>
+      </dgm:t>
+    </dgm:pt>
+    <dgm:pt modelId="{8574F83D-7A3D-4EF9-AA00-9DEEC46DED88}" type="parTrans" cxnId="{78E0F31F-1042-4A8E-A3B1-2B5434DE9139}">
+      <dgm:prSet/>
+      <dgm:spPr/>
+      <dgm:t>
+        <a:bodyPr/>
+        <a:lstStyle/>
+        <a:p>
+          <a:endParaRPr lang="en-US"/>
+        </a:p>
+      </dgm:t>
+    </dgm:pt>
+    <dgm:pt modelId="{C9D13563-BC12-4C9D-8FF3-52EF239997BF}" type="sibTrans" cxnId="{78E0F31F-1042-4A8E-A3B1-2B5434DE9139}">
+      <dgm:prSet/>
+      <dgm:spPr/>
+      <dgm:t>
+        <a:bodyPr/>
+        <a:lstStyle/>
+        <a:p>
+          <a:endParaRPr lang="en-US"/>
+        </a:p>
+      </dgm:t>
+    </dgm:pt>
     <dgm:pt modelId="{B1A52D1C-BD3A-4A2B-B34C-AF064BEB00AF}" type="pres">
       <dgm:prSet presAssocID="{41A0FF62-DB7B-41DE-9A04-9853F0280A0B}" presName="theList" presStyleCnt="0">
         <dgm:presLayoutVars>
@@ -1320,7 +1417,7 @@
       <dgm:spPr/>
     </dgm:pt>
     <dgm:pt modelId="{5692E791-0210-4C81-AB1D-86EFC22488A2}" type="pres">
-      <dgm:prSet presAssocID="{F4655935-7EB0-4317-862E-5458CB8B66C3}" presName="childNode" presStyleLbl="node1" presStyleIdx="0" presStyleCnt="6">
+      <dgm:prSet presAssocID="{F4655935-7EB0-4317-862E-5458CB8B66C3}" presName="childNode" presStyleLbl="node1" presStyleIdx="0" presStyleCnt="8">
         <dgm:presLayoutVars>
           <dgm:bulletEnabled val="1"/>
         </dgm:presLayoutVars>
@@ -1332,7 +1429,7 @@
       <dgm:spPr/>
     </dgm:pt>
     <dgm:pt modelId="{8796BA31-2222-4BF1-B135-12B66CA7FB7B}" type="pres">
-      <dgm:prSet presAssocID="{A786FCBF-EF7D-431E-B446-6286DC23E6A8}" presName="childNode" presStyleLbl="node1" presStyleIdx="1" presStyleCnt="6">
+      <dgm:prSet presAssocID="{A786FCBF-EF7D-431E-B446-6286DC23E6A8}" presName="childNode" presStyleLbl="node1" presStyleIdx="1" presStyleCnt="8">
         <dgm:presLayoutVars>
           <dgm:bulletEnabled val="1"/>
         </dgm:presLayoutVars>
@@ -1344,7 +1441,7 @@
       <dgm:spPr/>
     </dgm:pt>
     <dgm:pt modelId="{4E7C4206-324B-46CC-8370-5F47BA7E6345}" type="pres">
-      <dgm:prSet presAssocID="{7D17DD25-6959-49F4-9A64-F052F350C9B2}" presName="childNode" presStyleLbl="node1" presStyleIdx="2" presStyleCnt="6" custLinFactNeighborX="0" custLinFactNeighborY="17595">
+      <dgm:prSet presAssocID="{7D17DD25-6959-49F4-9A64-F052F350C9B2}" presName="childNode" presStyleLbl="node1" presStyleIdx="2" presStyleCnt="8" custLinFactNeighborX="0" custLinFactNeighborY="17595">
         <dgm:presLayoutVars>
           <dgm:bulletEnabled val="1"/>
         </dgm:presLayoutVars>
@@ -1376,7 +1473,7 @@
       <dgm:spPr/>
     </dgm:pt>
     <dgm:pt modelId="{03EFAAA9-E28C-4B12-B7F0-50562CC0727E}" type="pres">
-      <dgm:prSet presAssocID="{174548AA-D534-44C7-B1EF-6816570B3202}" presName="childNode" presStyleLbl="node1" presStyleIdx="3" presStyleCnt="6">
+      <dgm:prSet presAssocID="{174548AA-D534-44C7-B1EF-6816570B3202}" presName="childNode" presStyleLbl="node1" presStyleIdx="3" presStyleCnt="8">
         <dgm:presLayoutVars>
           <dgm:bulletEnabled val="1"/>
         </dgm:presLayoutVars>
@@ -1388,7 +1485,7 @@
       <dgm:spPr/>
     </dgm:pt>
     <dgm:pt modelId="{2AC16F3B-D212-4770-A00D-E136E6A831B5}" type="pres">
-      <dgm:prSet presAssocID="{248F8990-45EE-45A6-A89E-30CB0EFE4EE1}" presName="childNode" presStyleLbl="node1" presStyleIdx="4" presStyleCnt="6">
+      <dgm:prSet presAssocID="{248F8990-45EE-45A6-A89E-30CB0EFE4EE1}" presName="childNode" presStyleLbl="node1" presStyleIdx="4" presStyleCnt="8">
         <dgm:presLayoutVars>
           <dgm:bulletEnabled val="1"/>
         </dgm:presLayoutVars>
@@ -1400,7 +1497,31 @@
       <dgm:spPr/>
     </dgm:pt>
     <dgm:pt modelId="{A8C3A952-FFF6-44C7-AC1F-195A7FA0E646}" type="pres">
-      <dgm:prSet presAssocID="{9274DCA7-C620-40CE-A3E7-6A73576DE79C}" presName="childNode" presStyleLbl="node1" presStyleIdx="5" presStyleCnt="6">
+      <dgm:prSet presAssocID="{9274DCA7-C620-40CE-A3E7-6A73576DE79C}" presName="childNode" presStyleLbl="node1" presStyleIdx="5" presStyleCnt="8">
+        <dgm:presLayoutVars>
+          <dgm:bulletEnabled val="1"/>
+        </dgm:presLayoutVars>
+      </dgm:prSet>
+      <dgm:spPr/>
+    </dgm:pt>
+    <dgm:pt modelId="{519BCDA0-AF18-4EB1-855D-AA17B09584DB}" type="pres">
+      <dgm:prSet presAssocID="{9274DCA7-C620-40CE-A3E7-6A73576DE79C}" presName="aSpace2" presStyleCnt="0"/>
+      <dgm:spPr/>
+    </dgm:pt>
+    <dgm:pt modelId="{A2CCE8B2-9EC7-44CE-A273-33C911E55B9C}" type="pres">
+      <dgm:prSet presAssocID="{31D1216E-C91E-4893-9BF3-20BB0BF21907}" presName="childNode" presStyleLbl="node1" presStyleIdx="6" presStyleCnt="8">
+        <dgm:presLayoutVars>
+          <dgm:bulletEnabled val="1"/>
+        </dgm:presLayoutVars>
+      </dgm:prSet>
+      <dgm:spPr/>
+    </dgm:pt>
+    <dgm:pt modelId="{10E599F4-74F8-461F-AA4D-E98610C8A7A0}" type="pres">
+      <dgm:prSet presAssocID="{31D1216E-C91E-4893-9BF3-20BB0BF21907}" presName="aSpace2" presStyleCnt="0"/>
+      <dgm:spPr/>
+    </dgm:pt>
+    <dgm:pt modelId="{E994700B-8E7A-4A75-BE94-436BC92B61CC}" type="pres">
+      <dgm:prSet presAssocID="{695119D0-0D83-4718-84A4-FFE1912513CA}" presName="childNode" presStyleLbl="node1" presStyleIdx="7" presStyleCnt="8">
         <dgm:presLayoutVars>
           <dgm:bulletEnabled val="1"/>
         </dgm:presLayoutVars>
@@ -1412,6 +1533,7 @@
     <dgm:cxn modelId="{3D08CD09-3D63-4F65-BD96-51A465D39FB7}" type="presOf" srcId="{9274DCA7-C620-40CE-A3E7-6A73576DE79C}" destId="{A8C3A952-FFF6-44C7-AC1F-195A7FA0E646}" srcOrd="0" destOrd="0" presId="urn:microsoft.com/office/officeart/2005/8/layout/lProcess2"/>
     <dgm:cxn modelId="{D3C41D0F-1598-4760-96F2-26692ED12028}" srcId="{D9A49922-46BB-460D-A888-D4FA6E2CA661}" destId="{F4655935-7EB0-4317-862E-5458CB8B66C3}" srcOrd="0" destOrd="0" parTransId="{5F84997C-08E2-4C6A-BF41-539519D23D20}" sibTransId="{E91FB476-F3F1-49CE-B310-95FC0D6BE09E}"/>
     <dgm:cxn modelId="{1704E90F-9FAD-414C-A9CF-641977C124C0}" type="presOf" srcId="{41A0FF62-DB7B-41DE-9A04-9853F0280A0B}" destId="{B1A52D1C-BD3A-4A2B-B34C-AF064BEB00AF}" srcOrd="0" destOrd="0" presId="urn:microsoft.com/office/officeart/2005/8/layout/lProcess2"/>
+    <dgm:cxn modelId="{78E0F31F-1042-4A8E-A3B1-2B5434DE9139}" srcId="{5F7A2DA2-6457-41F8-976F-867BCA9EB67E}" destId="{695119D0-0D83-4718-84A4-FFE1912513CA}" srcOrd="4" destOrd="0" parTransId="{8574F83D-7A3D-4EF9-AA00-9DEEC46DED88}" sibTransId="{C9D13563-BC12-4C9D-8FF3-52EF239997BF}"/>
     <dgm:cxn modelId="{43F34B20-F4BC-4DA8-9378-156360E5B682}" type="presOf" srcId="{248F8990-45EE-45A6-A89E-30CB0EFE4EE1}" destId="{2AC16F3B-D212-4770-A00D-E136E6A831B5}" srcOrd="0" destOrd="0" presId="urn:microsoft.com/office/officeart/2005/8/layout/lProcess2"/>
     <dgm:cxn modelId="{55D6B827-2314-408C-AB68-47B7E8DB747C}" type="presOf" srcId="{7D17DD25-6959-49F4-9A64-F052F350C9B2}" destId="{4E7C4206-324B-46CC-8370-5F47BA7E6345}" srcOrd="0" destOrd="0" presId="urn:microsoft.com/office/officeart/2005/8/layout/lProcess2"/>
     <dgm:cxn modelId="{CC526432-1697-4ACD-B22C-2B26C5F0D472}" srcId="{D9A49922-46BB-460D-A888-D4FA6E2CA661}" destId="{7D17DD25-6959-49F4-9A64-F052F350C9B2}" srcOrd="2" destOrd="0" parTransId="{8CBB397D-CCD9-4BCD-9919-3AE75BCB34C1}" sibTransId="{490BF17C-4CD0-4C7D-9063-9E20EF8E7CCD}"/>
@@ -1419,10 +1541,13 @@
     <dgm:cxn modelId="{82D4C046-E2EA-4563-B691-002C79E55E30}" srcId="{41A0FF62-DB7B-41DE-9A04-9853F0280A0B}" destId="{5F7A2DA2-6457-41F8-976F-867BCA9EB67E}" srcOrd="1" destOrd="0" parTransId="{F9B83633-6385-4F12-AF29-9D1AC6945039}" sibTransId="{1F180147-ED41-413D-800B-FCFF98292DA1}"/>
     <dgm:cxn modelId="{90F87D67-6D54-4A4C-9A77-E359A6B6BB67}" type="presOf" srcId="{5F7A2DA2-6457-41F8-976F-867BCA9EB67E}" destId="{F6C5029D-B7F2-499C-B3A8-14B0964F1315}" srcOrd="1" destOrd="0" presId="urn:microsoft.com/office/officeart/2005/8/layout/lProcess2"/>
     <dgm:cxn modelId="{16F1746C-FA15-49A4-93E9-35120BA9A7E5}" type="presOf" srcId="{A786FCBF-EF7D-431E-B446-6286DC23E6A8}" destId="{8796BA31-2222-4BF1-B135-12B66CA7FB7B}" srcOrd="0" destOrd="0" presId="urn:microsoft.com/office/officeart/2005/8/layout/lProcess2"/>
+    <dgm:cxn modelId="{C073F451-9775-4163-9119-4F883EDB8FE0}" type="presOf" srcId="{31D1216E-C91E-4893-9BF3-20BB0BF21907}" destId="{A2CCE8B2-9EC7-44CE-A273-33C911E55B9C}" srcOrd="0" destOrd="0" presId="urn:microsoft.com/office/officeart/2005/8/layout/lProcess2"/>
+    <dgm:cxn modelId="{6D0B7977-7484-47F5-91F5-7D2EF86CDD89}" srcId="{5F7A2DA2-6457-41F8-976F-867BCA9EB67E}" destId="{31D1216E-C91E-4893-9BF3-20BB0BF21907}" srcOrd="3" destOrd="0" parTransId="{C1C1FC31-55D7-44B3-BA60-02893AB87129}" sibTransId="{E59AA517-E02F-4F4D-8785-33958331F080}"/>
     <dgm:cxn modelId="{7F73B97B-5B4E-46F8-8F68-EE020D4C68E9}" srcId="{5F7A2DA2-6457-41F8-976F-867BCA9EB67E}" destId="{9274DCA7-C620-40CE-A3E7-6A73576DE79C}" srcOrd="2" destOrd="0" parTransId="{B964051A-882E-42B2-9199-11B7BF7B4B69}" sibTransId="{5945E388-AB24-475E-87A4-29EB3CAFD70F}"/>
     <dgm:cxn modelId="{2C458191-7F85-4C21-A67B-B8562133165A}" type="presOf" srcId="{5F7A2DA2-6457-41F8-976F-867BCA9EB67E}" destId="{A24E8588-59EA-4053-A5A6-2ACB4157EC68}" srcOrd="0" destOrd="0" presId="urn:microsoft.com/office/officeart/2005/8/layout/lProcess2"/>
     <dgm:cxn modelId="{AD877B95-7D1C-4CB2-B80D-5D2F685B83E9}" srcId="{D9A49922-46BB-460D-A888-D4FA6E2CA661}" destId="{A786FCBF-EF7D-431E-B446-6286DC23E6A8}" srcOrd="1" destOrd="0" parTransId="{4D8694B4-517A-4AFF-BE81-22FF1F13B677}" sibTransId="{BC610CCD-0935-4CA1-B763-3131D98BCFBF}"/>
     <dgm:cxn modelId="{647B279D-B552-4BFC-8FD2-ADA17D9BC62F}" type="presOf" srcId="{D9A49922-46BB-460D-A888-D4FA6E2CA661}" destId="{EC1C4B66-876F-48AD-80B7-4D7AD5CFA968}" srcOrd="1" destOrd="0" presId="urn:microsoft.com/office/officeart/2005/8/layout/lProcess2"/>
+    <dgm:cxn modelId="{B389ECA0-2228-4694-B47D-D5262AC90B15}" type="presOf" srcId="{695119D0-0D83-4718-84A4-FFE1912513CA}" destId="{E994700B-8E7A-4A75-BE94-436BC92B61CC}" srcOrd="0" destOrd="0" presId="urn:microsoft.com/office/officeart/2005/8/layout/lProcess2"/>
     <dgm:cxn modelId="{BBB1B8A6-CC88-4BCB-85F0-17D107966CFF}" srcId="{5F7A2DA2-6457-41F8-976F-867BCA9EB67E}" destId="{174548AA-D534-44C7-B1EF-6816570B3202}" srcOrd="0" destOrd="0" parTransId="{2C36FE7D-35F9-481E-A032-4687DD2377B3}" sibTransId="{6B178B52-B5BA-40D3-AB04-72E702B3A862}"/>
     <dgm:cxn modelId="{9537FDB3-E3A4-4BE6-AEEC-20BFC8A6FF7F}" type="presOf" srcId="{F4655935-7EB0-4317-862E-5458CB8B66C3}" destId="{5692E791-0210-4C81-AB1D-86EFC22488A2}" srcOrd="0" destOrd="0" presId="urn:microsoft.com/office/officeart/2005/8/layout/lProcess2"/>
     <dgm:cxn modelId="{7EDB35E9-FB31-417F-B7F0-7D70DDE3F8E4}" type="presOf" srcId="{174548AA-D534-44C7-B1EF-6816570B3202}" destId="{03EFAAA9-E28C-4B12-B7F0-50562CC0727E}" srcOrd="0" destOrd="0" presId="urn:microsoft.com/office/officeart/2005/8/layout/lProcess2"/>
@@ -1449,6 +1574,10 @@
     <dgm:cxn modelId="{322B1A73-565A-433E-AEBA-CA3091405F33}" type="presParOf" srcId="{EE673518-AB5E-4A1E-B3C6-069935C955F8}" destId="{2AC16F3B-D212-4770-A00D-E136E6A831B5}" srcOrd="2" destOrd="0" presId="urn:microsoft.com/office/officeart/2005/8/layout/lProcess2"/>
     <dgm:cxn modelId="{2C309C0F-8CAA-41ED-B933-F32AD814007A}" type="presParOf" srcId="{EE673518-AB5E-4A1E-B3C6-069935C955F8}" destId="{DFC93A5E-8232-4637-A5F0-F612EDE49B6C}" srcOrd="3" destOrd="0" presId="urn:microsoft.com/office/officeart/2005/8/layout/lProcess2"/>
     <dgm:cxn modelId="{4DB1F35E-78DA-490A-939D-15BDE419CAEE}" type="presParOf" srcId="{EE673518-AB5E-4A1E-B3C6-069935C955F8}" destId="{A8C3A952-FFF6-44C7-AC1F-195A7FA0E646}" srcOrd="4" destOrd="0" presId="urn:microsoft.com/office/officeart/2005/8/layout/lProcess2"/>
+    <dgm:cxn modelId="{7AF9D875-6B93-4009-98EA-50496EF2B556}" type="presParOf" srcId="{EE673518-AB5E-4A1E-B3C6-069935C955F8}" destId="{519BCDA0-AF18-4EB1-855D-AA17B09584DB}" srcOrd="5" destOrd="0" presId="urn:microsoft.com/office/officeart/2005/8/layout/lProcess2"/>
+    <dgm:cxn modelId="{9B289C92-DDA8-4F31-B51D-F8BD74782F1E}" type="presParOf" srcId="{EE673518-AB5E-4A1E-B3C6-069935C955F8}" destId="{A2CCE8B2-9EC7-44CE-A273-33C911E55B9C}" srcOrd="6" destOrd="0" presId="urn:microsoft.com/office/officeart/2005/8/layout/lProcess2"/>
+    <dgm:cxn modelId="{29395D8B-0F7E-4C37-9228-6A0A197F7257}" type="presParOf" srcId="{EE673518-AB5E-4A1E-B3C6-069935C955F8}" destId="{10E599F4-74F8-461F-AA4D-E98610C8A7A0}" srcOrd="7" destOrd="0" presId="urn:microsoft.com/office/officeart/2005/8/layout/lProcess2"/>
+    <dgm:cxn modelId="{458EB887-301C-429C-8B7C-B75C21E6B16A}" type="presParOf" srcId="{EE673518-AB5E-4A1E-B3C6-069935C955F8}" destId="{E994700B-8E7A-4A75-BE94-436BC92B61CC}" srcOrd="8" destOrd="0" presId="urn:microsoft.com/office/officeart/2005/8/layout/lProcess2"/>
   </dgm:cxnLst>
   <dgm:bg/>
   <dgm:whole/>
@@ -1674,9 +1803,9 @@
           <a:gsLst>
             <a:gs pos="0">
               <a:schemeClr val="accent5">
-                <a:hueOff val="-1351709"/>
-                <a:satOff val="-3484"/>
-                <a:lumOff val="-2353"/>
+                <a:hueOff val="-965506"/>
+                <a:satOff val="-2488"/>
+                <a:lumOff val="-1681"/>
                 <a:alphaOff val="0"/>
                 <a:satMod val="103000"/>
                 <a:lumMod val="102000"/>
@@ -1685,9 +1814,9 @@
             </a:gs>
             <a:gs pos="50000">
               <a:schemeClr val="accent5">
-                <a:hueOff val="-1351709"/>
-                <a:satOff val="-3484"/>
-                <a:lumOff val="-2353"/>
+                <a:hueOff val="-965506"/>
+                <a:satOff val="-2488"/>
+                <a:lumOff val="-1681"/>
                 <a:alphaOff val="0"/>
                 <a:satMod val="110000"/>
                 <a:lumMod val="100000"/>
@@ -1696,9 +1825,9 @@
             </a:gs>
             <a:gs pos="100000">
               <a:schemeClr val="accent5">
-                <a:hueOff val="-1351709"/>
-                <a:satOff val="-3484"/>
-                <a:lumOff val="-2353"/>
+                <a:hueOff val="-965506"/>
+                <a:satOff val="-2488"/>
+                <a:lumOff val="-1681"/>
                 <a:alphaOff val="0"/>
                 <a:lumMod val="99000"/>
                 <a:satMod val="120000"/>
@@ -1784,9 +1913,9 @@
           <a:gsLst>
             <a:gs pos="0">
               <a:schemeClr val="accent5">
-                <a:hueOff val="-2703417"/>
-                <a:satOff val="-6968"/>
-                <a:lumOff val="-4706"/>
+                <a:hueOff val="-1931012"/>
+                <a:satOff val="-4977"/>
+                <a:lumOff val="-3361"/>
                 <a:alphaOff val="0"/>
                 <a:satMod val="103000"/>
                 <a:lumMod val="102000"/>
@@ -1795,9 +1924,9 @@
             </a:gs>
             <a:gs pos="50000">
               <a:schemeClr val="accent5">
-                <a:hueOff val="-2703417"/>
-                <a:satOff val="-6968"/>
-                <a:lumOff val="-4706"/>
+                <a:hueOff val="-1931012"/>
+                <a:satOff val="-4977"/>
+                <a:lumOff val="-3361"/>
                 <a:alphaOff val="0"/>
                 <a:satMod val="110000"/>
                 <a:lumMod val="100000"/>
@@ -1806,9 +1935,9 @@
             </a:gs>
             <a:gs pos="100000">
               <a:schemeClr val="accent5">
-                <a:hueOff val="-2703417"/>
-                <a:satOff val="-6968"/>
-                <a:lumOff val="-4706"/>
+                <a:hueOff val="-1931012"/>
+                <a:satOff val="-4977"/>
+                <a:lumOff val="-3361"/>
                 <a:alphaOff val="0"/>
                 <a:lumMod val="99000"/>
                 <a:satMod val="120000"/>
@@ -1957,8 +2086,8 @@
       </dsp:nvSpPr>
       <dsp:spPr>
         <a:xfrm>
-          <a:off x="4580976" y="1217671"/>
-          <a:ext cx="3116205" cy="797185"/>
+          <a:off x="4580976" y="1218092"/>
+          <a:ext cx="3116205" cy="469425"/>
         </a:xfrm>
         <a:prstGeom prst="roundRect">
           <a:avLst>
@@ -1969,9 +2098,9 @@
           <a:gsLst>
             <a:gs pos="0">
               <a:schemeClr val="accent5">
-                <a:hueOff val="-4055126"/>
-                <a:satOff val="-10451"/>
-                <a:lumOff val="-7059"/>
+                <a:hueOff val="-2896518"/>
+                <a:satOff val="-7465"/>
+                <a:lumOff val="-5042"/>
                 <a:alphaOff val="0"/>
                 <a:satMod val="103000"/>
                 <a:lumMod val="102000"/>
@@ -1980,9 +2109,9 @@
             </a:gs>
             <a:gs pos="50000">
               <a:schemeClr val="accent5">
-                <a:hueOff val="-4055126"/>
-                <a:satOff val="-10451"/>
-                <a:lumOff val="-7059"/>
+                <a:hueOff val="-2896518"/>
+                <a:satOff val="-7465"/>
+                <a:lumOff val="-5042"/>
                 <a:alphaOff val="0"/>
                 <a:satMod val="110000"/>
                 <a:lumMod val="100000"/>
@@ -1991,9 +2120,9 @@
             </a:gs>
             <a:gs pos="100000">
               <a:schemeClr val="accent5">
-                <a:hueOff val="-4055126"/>
-                <a:satOff val="-10451"/>
-                <a:lumOff val="-7059"/>
+                <a:hueOff val="-2896518"/>
+                <a:satOff val="-7465"/>
+                <a:lumOff val="-5042"/>
                 <a:alphaOff val="0"/>
                 <a:lumMod val="99000"/>
                 <a:satMod val="120000"/>
@@ -2063,8 +2192,8 @@
         </a:p>
       </dsp:txBody>
       <dsp:txXfrm>
-        <a:off x="4604325" y="1241020"/>
-        <a:ext cx="3069507" cy="750487"/>
+        <a:off x="4594725" y="1231841"/>
+        <a:ext cx="3088707" cy="441927"/>
       </dsp:txXfrm>
     </dsp:sp>
     <dsp:sp modelId="{2AC16F3B-D212-4770-A00D-E136E6A831B5}">
@@ -2074,8 +2203,8 @@
       </dsp:nvSpPr>
       <dsp:spPr>
         <a:xfrm>
-          <a:off x="4580976" y="2137501"/>
-          <a:ext cx="3116205" cy="797185"/>
+          <a:off x="4580976" y="1759737"/>
+          <a:ext cx="3116205" cy="469425"/>
         </a:xfrm>
         <a:prstGeom prst="roundRect">
           <a:avLst>
@@ -2086,9 +2215,9 @@
           <a:gsLst>
             <a:gs pos="0">
               <a:schemeClr val="accent5">
-                <a:hueOff val="-5406834"/>
-                <a:satOff val="-13935"/>
-                <a:lumOff val="-9412"/>
+                <a:hueOff val="-3862025"/>
+                <a:satOff val="-9954"/>
+                <a:lumOff val="-6723"/>
                 <a:alphaOff val="0"/>
                 <a:satMod val="103000"/>
                 <a:lumMod val="102000"/>
@@ -2097,9 +2226,9 @@
             </a:gs>
             <a:gs pos="50000">
               <a:schemeClr val="accent5">
-                <a:hueOff val="-5406834"/>
-                <a:satOff val="-13935"/>
-                <a:lumOff val="-9412"/>
+                <a:hueOff val="-3862025"/>
+                <a:satOff val="-9954"/>
+                <a:lumOff val="-6723"/>
                 <a:alphaOff val="0"/>
                 <a:satMod val="110000"/>
                 <a:lumMod val="100000"/>
@@ -2108,9 +2237,9 @@
             </a:gs>
             <a:gs pos="100000">
               <a:schemeClr val="accent5">
-                <a:hueOff val="-5406834"/>
-                <a:satOff val="-13935"/>
-                <a:lumOff val="-9412"/>
+                <a:hueOff val="-3862025"/>
+                <a:satOff val="-9954"/>
+                <a:lumOff val="-6723"/>
                 <a:alphaOff val="0"/>
                 <a:lumMod val="99000"/>
                 <a:satMod val="120000"/>
@@ -2195,8 +2324,8 @@
         </a:p>
       </dsp:txBody>
       <dsp:txXfrm>
-        <a:off x="4604325" y="2160850"/>
-        <a:ext cx="3069507" cy="750487"/>
+        <a:off x="4594725" y="1773486"/>
+        <a:ext cx="3088707" cy="441927"/>
       </dsp:txXfrm>
     </dsp:sp>
     <dsp:sp modelId="{A8C3A952-FFF6-44C7-AC1F-195A7FA0E646}">
@@ -2206,8 +2335,244 @@
       </dsp:nvSpPr>
       <dsp:spPr>
         <a:xfrm>
-          <a:off x="4580976" y="3057330"/>
-          <a:ext cx="3116205" cy="797185"/>
+          <a:off x="4580976" y="2301381"/>
+          <a:ext cx="3116205" cy="469425"/>
+        </a:xfrm>
+        <a:prstGeom prst="roundRect">
+          <a:avLst>
+            <a:gd name="adj" fmla="val 10000"/>
+          </a:avLst>
+        </a:prstGeom>
+        <a:gradFill rotWithShape="0">
+          <a:gsLst>
+            <a:gs pos="0">
+              <a:schemeClr val="accent5">
+                <a:hueOff val="-4827531"/>
+                <a:satOff val="-12442"/>
+                <a:lumOff val="-8404"/>
+                <a:alphaOff val="0"/>
+                <a:satMod val="103000"/>
+                <a:lumMod val="102000"/>
+                <a:tint val="94000"/>
+              </a:schemeClr>
+            </a:gs>
+            <a:gs pos="50000">
+              <a:schemeClr val="accent5">
+                <a:hueOff val="-4827531"/>
+                <a:satOff val="-12442"/>
+                <a:lumOff val="-8404"/>
+                <a:alphaOff val="0"/>
+                <a:satMod val="110000"/>
+                <a:lumMod val="100000"/>
+                <a:shade val="100000"/>
+              </a:schemeClr>
+            </a:gs>
+            <a:gs pos="100000">
+              <a:schemeClr val="accent5">
+                <a:hueOff val="-4827531"/>
+                <a:satOff val="-12442"/>
+                <a:lumOff val="-8404"/>
+                <a:alphaOff val="0"/>
+                <a:lumMod val="99000"/>
+                <a:satMod val="120000"/>
+                <a:shade val="78000"/>
+              </a:schemeClr>
+            </a:gs>
+          </a:gsLst>
+          <a:lin ang="5400000" scaled="0"/>
+        </a:gradFill>
+        <a:ln>
+          <a:noFill/>
+        </a:ln>
+        <a:effectLst>
+          <a:outerShdw blurRad="57150" dist="19050" dir="5400000" algn="ctr" rotWithShape="0">
+            <a:srgbClr val="000000">
+              <a:alpha val="63000"/>
+            </a:srgbClr>
+          </a:outerShdw>
+        </a:effectLst>
+      </dsp:spPr>
+      <dsp:style>
+        <a:lnRef idx="0">
+          <a:scrgbClr r="0" g="0" b="0"/>
+        </a:lnRef>
+        <a:fillRef idx="3">
+          <a:scrgbClr r="0" g="0" b="0"/>
+        </a:fillRef>
+        <a:effectRef idx="3">
+          <a:scrgbClr r="0" g="0" b="0"/>
+        </a:effectRef>
+        <a:fontRef idx="minor">
+          <a:schemeClr val="lt1"/>
+        </a:fontRef>
+      </dsp:style>
+      <dsp:txBody>
+        <a:bodyPr spcFirstLastPara="0" vert="horz" wrap="square" lIns="35560" tIns="26670" rIns="35560" bIns="26670" numCol="1" spcCol="1270" anchor="ctr" anchorCtr="0">
+          <a:noAutofit/>
+        </a:bodyPr>
+        <a:lstStyle/>
+        <a:p>
+          <a:pPr marL="0" lvl="0" indent="0" algn="ctr" defTabSz="622300">
+            <a:lnSpc>
+              <a:spcPct val="90000"/>
+            </a:lnSpc>
+            <a:spcBef>
+              <a:spcPct val="0"/>
+            </a:spcBef>
+            <a:spcAft>
+              <a:spcPct val="35000"/>
+            </a:spcAft>
+            <a:buNone/>
+          </a:pPr>
+          <a:r>
+            <a:rPr lang="en-US" sz="1400" b="1" kern="1200" dirty="0" err="1">
+              <a:solidFill>
+                <a:prstClr val="white"/>
+              </a:solidFill>
+              <a:latin typeface="Segoe "/>
+              <a:ea typeface="+mn-ea"/>
+              <a:cs typeface="+mn-cs"/>
+            </a:rPr>
+            <a:t>efficientnet</a:t>
+          </a:r>
+          <a:endParaRPr lang="en-US" sz="1400" b="1" kern="1200" dirty="0">
+            <a:solidFill>
+              <a:prstClr val="white"/>
+            </a:solidFill>
+            <a:latin typeface="Segoe "/>
+            <a:ea typeface="+mn-ea"/>
+            <a:cs typeface="+mn-cs"/>
+          </a:endParaRPr>
+        </a:p>
+      </dsp:txBody>
+      <dsp:txXfrm>
+        <a:off x="4594725" y="2315130"/>
+        <a:ext cx="3088707" cy="441927"/>
+      </dsp:txXfrm>
+    </dsp:sp>
+    <dsp:sp modelId="{A2CCE8B2-9EC7-44CE-A273-33C911E55B9C}">
+      <dsp:nvSpPr>
+        <dsp:cNvPr id="0" name=""/>
+        <dsp:cNvSpPr/>
+      </dsp:nvSpPr>
+      <dsp:spPr>
+        <a:xfrm>
+          <a:off x="4580976" y="2843025"/>
+          <a:ext cx="3116205" cy="469425"/>
+        </a:xfrm>
+        <a:prstGeom prst="roundRect">
+          <a:avLst>
+            <a:gd name="adj" fmla="val 10000"/>
+          </a:avLst>
+        </a:prstGeom>
+        <a:gradFill rotWithShape="0">
+          <a:gsLst>
+            <a:gs pos="0">
+              <a:schemeClr val="accent5">
+                <a:hueOff val="-5793037"/>
+                <a:satOff val="-14931"/>
+                <a:lumOff val="-10084"/>
+                <a:alphaOff val="0"/>
+                <a:satMod val="103000"/>
+                <a:lumMod val="102000"/>
+                <a:tint val="94000"/>
+              </a:schemeClr>
+            </a:gs>
+            <a:gs pos="50000">
+              <a:schemeClr val="accent5">
+                <a:hueOff val="-5793037"/>
+                <a:satOff val="-14931"/>
+                <a:lumOff val="-10084"/>
+                <a:alphaOff val="0"/>
+                <a:satMod val="110000"/>
+                <a:lumMod val="100000"/>
+                <a:shade val="100000"/>
+              </a:schemeClr>
+            </a:gs>
+            <a:gs pos="100000">
+              <a:schemeClr val="accent5">
+                <a:hueOff val="-5793037"/>
+                <a:satOff val="-14931"/>
+                <a:lumOff val="-10084"/>
+                <a:alphaOff val="0"/>
+                <a:lumMod val="99000"/>
+                <a:satMod val="120000"/>
+                <a:shade val="78000"/>
+              </a:schemeClr>
+            </a:gs>
+          </a:gsLst>
+          <a:lin ang="5400000" scaled="0"/>
+        </a:gradFill>
+        <a:ln>
+          <a:noFill/>
+        </a:ln>
+        <a:effectLst>
+          <a:outerShdw blurRad="57150" dist="19050" dir="5400000" algn="ctr" rotWithShape="0">
+            <a:srgbClr val="000000">
+              <a:alpha val="63000"/>
+            </a:srgbClr>
+          </a:outerShdw>
+        </a:effectLst>
+      </dsp:spPr>
+      <dsp:style>
+        <a:lnRef idx="0">
+          <a:scrgbClr r="0" g="0" b="0"/>
+        </a:lnRef>
+        <a:fillRef idx="3">
+          <a:scrgbClr r="0" g="0" b="0"/>
+        </a:fillRef>
+        <a:effectRef idx="3">
+          <a:scrgbClr r="0" g="0" b="0"/>
+        </a:effectRef>
+        <a:fontRef idx="minor">
+          <a:schemeClr val="lt1"/>
+        </a:fontRef>
+      </dsp:style>
+      <dsp:txBody>
+        <a:bodyPr spcFirstLastPara="0" vert="horz" wrap="square" lIns="35560" tIns="26670" rIns="35560" bIns="26670" numCol="1" spcCol="1270" anchor="ctr" anchorCtr="0">
+          <a:noAutofit/>
+        </a:bodyPr>
+        <a:lstStyle/>
+        <a:p>
+          <a:pPr marL="0" lvl="0" indent="0" algn="ctr" defTabSz="622300">
+            <a:lnSpc>
+              <a:spcPct val="90000"/>
+            </a:lnSpc>
+            <a:spcBef>
+              <a:spcPct val="0"/>
+            </a:spcBef>
+            <a:spcAft>
+              <a:spcPct val="35000"/>
+            </a:spcAft>
+            <a:buNone/>
+          </a:pPr>
+          <a:r>
+            <a:rPr lang="en-US" sz="1400" b="1" kern="1200" dirty="0">
+              <a:solidFill>
+                <a:prstClr val="white"/>
+              </a:solidFill>
+              <a:latin typeface="Segoe "/>
+              <a:ea typeface="+mn-ea"/>
+              <a:cs typeface="+mn-cs"/>
+            </a:rPr>
+            <a:t>Resnet50</a:t>
+          </a:r>
+        </a:p>
+      </dsp:txBody>
+      <dsp:txXfrm>
+        <a:off x="4594725" y="2856774"/>
+        <a:ext cx="3088707" cy="441927"/>
+      </dsp:txXfrm>
+    </dsp:sp>
+    <dsp:sp modelId="{E994700B-8E7A-4A75-BE94-436BC92B61CC}">
+      <dsp:nvSpPr>
+        <dsp:cNvPr id="0" name=""/>
+        <dsp:cNvSpPr/>
+      </dsp:nvSpPr>
+      <dsp:spPr>
+        <a:xfrm>
+          <a:off x="4580976" y="3384669"/>
+          <a:ext cx="3116205" cy="469425"/>
         </a:xfrm>
         <a:prstGeom prst="roundRect">
           <a:avLst>
@@ -2304,7 +2669,7 @@
               <a:ea typeface="+mn-ea"/>
               <a:cs typeface="+mn-cs"/>
             </a:rPr>
-            <a:t>efficientnet</a:t>
+            <a:t>mobilenet</a:t>
           </a:r>
           <a:endParaRPr lang="en-US" sz="1400" b="1" kern="1200" dirty="0">
             <a:solidFill>
@@ -2317,8 +2682,8 @@
         </a:p>
       </dsp:txBody>
       <dsp:txXfrm>
-        <a:off x="4604325" y="3080679"/>
-        <a:ext cx="3069507" cy="750487"/>
+        <a:off x="4594725" y="3398418"/>
+        <a:ext cx="3088707" cy="441927"/>
       </dsp:txXfrm>
     </dsp:sp>
   </dsp:spTree>
@@ -3668,7 +4033,7 @@
           <a:p>
             <a:fld id="{319B5B40-909F-4AAE-8513-9BFEE397F8E3}" type="datetimeFigureOut">
               <a:rPr lang="en-US" smtClean="0"/>
-              <a:t>12/6/2021</a:t>
+              <a:t>12/7/2021</a:t>
             </a:fld>
             <a:endParaRPr lang="en-US"/>
           </a:p>
@@ -4106,19 +4471,19 @@
           <a:bodyPr/>
           <a:lstStyle/>
           <a:p>
+            <a:r>
+              <a:rPr lang="en-US"/>
+              <a:t>slide 29 &amp; 30 </a:t>
+            </a:r>
+          </a:p>
+          <a:p>
+            <a:r>
+              <a:rPr lang="en-US"/>
+              <a:t>here is a boxplot of accuracy and ROC curve.</a:t>
+            </a:r>
+          </a:p>
+          <a:p>
             <a:endParaRPr lang="en-US"/>
-          </a:p>
-          <a:p>
-            <a:r>
-              <a:rPr lang="en-US"/>
-              <a:t>slide 33 </a:t>
-            </a:r>
-          </a:p>
-          <a:p>
-            <a:r>
-              <a:rPr lang="en-US"/>
-              <a:t>so based on the best condition, the COA time series has better results among other feature types. </a:t>
-            </a:r>
           </a:p>
           <a:p>
             <a:endParaRPr lang="en-US"/>
@@ -4151,7 +4516,7 @@
     </p:spTree>
     <p:extLst>
       <p:ext uri="{BB962C8B-B14F-4D97-AF65-F5344CB8AC3E}">
-        <p14:creationId xmlns:p14="http://schemas.microsoft.com/office/powerpoint/2010/main" val="3024911511"/>
+        <p14:creationId xmlns:p14="http://schemas.microsoft.com/office/powerpoint/2010/main" val="2942675996"/>
       </p:ext>
     </p:extLst>
   </p:cSld>
@@ -4205,6 +4570,21 @@
           <a:bodyPr/>
           <a:lstStyle/>
           <a:p>
+            <a:r>
+              <a:rPr lang="en-US"/>
+              <a:t>slide 29 &amp; 30 </a:t>
+            </a:r>
+          </a:p>
+          <a:p>
+            <a:r>
+              <a:rPr lang="en-US"/>
+              <a:t>here is a boxplot of accuracy and ROC curve.</a:t>
+            </a:r>
+          </a:p>
+          <a:p>
+            <a:endParaRPr lang="en-US"/>
+          </a:p>
+          <a:p>
             <a:endParaRPr lang="en-US"/>
           </a:p>
         </p:txBody>
@@ -4227,6 +4607,297 @@
             <a:fld id="{94048AF1-D332-4204-87C9-857C3838209B}" type="slidenum">
               <a:rPr lang="en-US" smtClean="0"/>
               <a:t>11</a:t>
+            </a:fld>
+            <a:endParaRPr lang="en-US"/>
+          </a:p>
+        </p:txBody>
+      </p:sp>
+    </p:spTree>
+    <p:extLst>
+      <p:ext uri="{BB962C8B-B14F-4D97-AF65-F5344CB8AC3E}">
+        <p14:creationId xmlns:p14="http://schemas.microsoft.com/office/powerpoint/2010/main" val="933206078"/>
+      </p:ext>
+    </p:extLst>
+  </p:cSld>
+  <p:clrMapOvr>
+    <a:masterClrMapping/>
+  </p:clrMapOvr>
+</p:notes>
+</file>
+
+<file path=ppt/notesSlides/notesSlide12.xml><?xml version="1.0" encoding="utf-8"?>
+<p:notes xmlns:a="http://schemas.openxmlformats.org/drawingml/2006/main" xmlns:r="http://schemas.openxmlformats.org/officeDocument/2006/relationships" xmlns:p="http://schemas.openxmlformats.org/presentationml/2006/main">
+  <p:cSld>
+    <p:spTree>
+      <p:nvGrpSpPr>
+        <p:cNvPr id="1" name=""/>
+        <p:cNvGrpSpPr/>
+        <p:nvPr/>
+      </p:nvGrpSpPr>
+      <p:grpSpPr>
+        <a:xfrm>
+          <a:off x="0" y="0"/>
+          <a:ext cx="0" cy="0"/>
+          <a:chOff x="0" y="0"/>
+          <a:chExt cx="0" cy="0"/>
+        </a:xfrm>
+      </p:grpSpPr>
+      <p:sp>
+        <p:nvSpPr>
+          <p:cNvPr id="2" name="Slide Image Placeholder 1"/>
+          <p:cNvSpPr>
+            <a:spLocks noGrp="1" noRot="1" noChangeAspect="1"/>
+          </p:cNvSpPr>
+          <p:nvPr>
+            <p:ph type="sldImg"/>
+          </p:nvPr>
+        </p:nvSpPr>
+        <p:spPr/>
+      </p:sp>
+      <p:sp>
+        <p:nvSpPr>
+          <p:cNvPr id="3" name="Notes Placeholder 2"/>
+          <p:cNvSpPr>
+            <a:spLocks noGrp="1"/>
+          </p:cNvSpPr>
+          <p:nvPr>
+            <p:ph type="body" idx="1"/>
+          </p:nvPr>
+        </p:nvSpPr>
+        <p:spPr/>
+        <p:txBody>
+          <a:bodyPr/>
+          <a:lstStyle/>
+          <a:p>
+            <a:r>
+              <a:rPr lang="en-US"/>
+              <a:t>slide 29 &amp; 30 </a:t>
+            </a:r>
+          </a:p>
+          <a:p>
+            <a:r>
+              <a:rPr lang="en-US"/>
+              <a:t>here is a boxplot of accuracy and ROC curve.</a:t>
+            </a:r>
+          </a:p>
+          <a:p>
+            <a:endParaRPr lang="en-US"/>
+          </a:p>
+          <a:p>
+            <a:endParaRPr lang="en-US"/>
+          </a:p>
+        </p:txBody>
+      </p:sp>
+      <p:sp>
+        <p:nvSpPr>
+          <p:cNvPr id="4" name="Slide Number Placeholder 3"/>
+          <p:cNvSpPr>
+            <a:spLocks noGrp="1"/>
+          </p:cNvSpPr>
+          <p:nvPr>
+            <p:ph type="sldNum" sz="quarter" idx="5"/>
+          </p:nvPr>
+        </p:nvSpPr>
+        <p:spPr/>
+        <p:txBody>
+          <a:bodyPr/>
+          <a:lstStyle/>
+          <a:p>
+            <a:fld id="{94048AF1-D332-4204-87C9-857C3838209B}" type="slidenum">
+              <a:rPr lang="en-US" smtClean="0"/>
+              <a:t>12</a:t>
+            </a:fld>
+            <a:endParaRPr lang="en-US"/>
+          </a:p>
+        </p:txBody>
+      </p:sp>
+    </p:spTree>
+    <p:extLst>
+      <p:ext uri="{BB962C8B-B14F-4D97-AF65-F5344CB8AC3E}">
+        <p14:creationId xmlns:p14="http://schemas.microsoft.com/office/powerpoint/2010/main" val="3060069457"/>
+      </p:ext>
+    </p:extLst>
+  </p:cSld>
+  <p:clrMapOvr>
+    <a:masterClrMapping/>
+  </p:clrMapOvr>
+</p:notes>
+</file>
+
+<file path=ppt/notesSlides/notesSlide13.xml><?xml version="1.0" encoding="utf-8"?>
+<p:notes xmlns:a="http://schemas.openxmlformats.org/drawingml/2006/main" xmlns:r="http://schemas.openxmlformats.org/officeDocument/2006/relationships" xmlns:p="http://schemas.openxmlformats.org/presentationml/2006/main">
+  <p:cSld>
+    <p:spTree>
+      <p:nvGrpSpPr>
+        <p:cNvPr id="1" name=""/>
+        <p:cNvGrpSpPr/>
+        <p:nvPr/>
+      </p:nvGrpSpPr>
+      <p:grpSpPr>
+        <a:xfrm>
+          <a:off x="0" y="0"/>
+          <a:ext cx="0" cy="0"/>
+          <a:chOff x="0" y="0"/>
+          <a:chExt cx="0" cy="0"/>
+        </a:xfrm>
+      </p:grpSpPr>
+      <p:sp>
+        <p:nvSpPr>
+          <p:cNvPr id="2" name="Slide Image Placeholder 1"/>
+          <p:cNvSpPr>
+            <a:spLocks noGrp="1" noRot="1" noChangeAspect="1"/>
+          </p:cNvSpPr>
+          <p:nvPr>
+            <p:ph type="sldImg"/>
+          </p:nvPr>
+        </p:nvSpPr>
+        <p:spPr/>
+      </p:sp>
+      <p:sp>
+        <p:nvSpPr>
+          <p:cNvPr id="3" name="Notes Placeholder 2"/>
+          <p:cNvSpPr>
+            <a:spLocks noGrp="1"/>
+          </p:cNvSpPr>
+          <p:nvPr>
+            <p:ph type="body" idx="1"/>
+          </p:nvPr>
+        </p:nvSpPr>
+        <p:spPr/>
+        <p:txBody>
+          <a:bodyPr/>
+          <a:lstStyle/>
+          <a:p>
+            <a:r>
+              <a:rPr lang="en-US"/>
+              <a:t>slide 28</a:t>
+            </a:r>
+          </a:p>
+          <a:p>
+            <a:r>
+              <a:rPr lang="en-US"/>
+              <a:t>about PCA, the performance of models decreased since we lost some variance. </a:t>
+            </a:r>
+          </a:p>
+          <a:p>
+            <a:r>
+              <a:rPr lang="en-US"/>
+              <a:t>But I think keeping 95 percent could be a good choice </a:t>
+            </a:r>
+          </a:p>
+          <a:p>
+            <a:r>
+              <a:rPr lang="en-US"/>
+              <a:t>because it reduces feature space by about one-fourth with the same accuracy as without PCA.</a:t>
+            </a:r>
+          </a:p>
+          <a:p>
+            <a:endParaRPr lang="en-US"/>
+          </a:p>
+        </p:txBody>
+      </p:sp>
+      <p:sp>
+        <p:nvSpPr>
+          <p:cNvPr id="4" name="Slide Number Placeholder 3"/>
+          <p:cNvSpPr>
+            <a:spLocks noGrp="1"/>
+          </p:cNvSpPr>
+          <p:nvPr>
+            <p:ph type="sldNum" sz="quarter" idx="5"/>
+          </p:nvPr>
+        </p:nvSpPr>
+        <p:spPr/>
+        <p:txBody>
+          <a:bodyPr/>
+          <a:lstStyle/>
+          <a:p>
+            <a:fld id="{94048AF1-D332-4204-87C9-857C3838209B}" type="slidenum">
+              <a:rPr lang="en-US" smtClean="0"/>
+              <a:t>13</a:t>
+            </a:fld>
+            <a:endParaRPr lang="en-US"/>
+          </a:p>
+        </p:txBody>
+      </p:sp>
+    </p:spTree>
+    <p:extLst>
+      <p:ext uri="{BB962C8B-B14F-4D97-AF65-F5344CB8AC3E}">
+        <p14:creationId xmlns:p14="http://schemas.microsoft.com/office/powerpoint/2010/main" val="3728638889"/>
+      </p:ext>
+    </p:extLst>
+  </p:cSld>
+  <p:clrMapOvr>
+    <a:masterClrMapping/>
+  </p:clrMapOvr>
+</p:notes>
+</file>
+
+<file path=ppt/notesSlides/notesSlide14.xml><?xml version="1.0" encoding="utf-8"?>
+<p:notes xmlns:a="http://schemas.openxmlformats.org/drawingml/2006/main" xmlns:r="http://schemas.openxmlformats.org/officeDocument/2006/relationships" xmlns:p="http://schemas.openxmlformats.org/presentationml/2006/main">
+  <p:cSld>
+    <p:spTree>
+      <p:nvGrpSpPr>
+        <p:cNvPr id="1" name=""/>
+        <p:cNvGrpSpPr/>
+        <p:nvPr/>
+      </p:nvGrpSpPr>
+      <p:grpSpPr>
+        <a:xfrm>
+          <a:off x="0" y="0"/>
+          <a:ext cx="0" cy="0"/>
+          <a:chOff x="0" y="0"/>
+          <a:chExt cx="0" cy="0"/>
+        </a:xfrm>
+      </p:grpSpPr>
+      <p:sp>
+        <p:nvSpPr>
+          <p:cNvPr id="2" name="Slide Image Placeholder 1"/>
+          <p:cNvSpPr>
+            <a:spLocks noGrp="1" noRot="1" noChangeAspect="1"/>
+          </p:cNvSpPr>
+          <p:nvPr>
+            <p:ph type="sldImg"/>
+          </p:nvPr>
+        </p:nvSpPr>
+        <p:spPr/>
+      </p:sp>
+      <p:sp>
+        <p:nvSpPr>
+          <p:cNvPr id="3" name="Notes Placeholder 2"/>
+          <p:cNvSpPr>
+            <a:spLocks noGrp="1"/>
+          </p:cNvSpPr>
+          <p:nvPr>
+            <p:ph type="body" idx="1"/>
+          </p:nvPr>
+        </p:nvSpPr>
+        <p:spPr/>
+        <p:txBody>
+          <a:bodyPr/>
+          <a:lstStyle/>
+          <a:p>
+            <a:endParaRPr lang="en-US"/>
+          </a:p>
+        </p:txBody>
+      </p:sp>
+      <p:sp>
+        <p:nvSpPr>
+          <p:cNvPr id="4" name="Slide Number Placeholder 3"/>
+          <p:cNvSpPr>
+            <a:spLocks noGrp="1"/>
+          </p:cNvSpPr>
+          <p:nvPr>
+            <p:ph type="sldNum" sz="quarter" idx="5"/>
+          </p:nvPr>
+        </p:nvSpPr>
+        <p:spPr/>
+        <p:txBody>
+          <a:bodyPr/>
+          <a:lstStyle/>
+          <a:p>
+            <a:fld id="{94048AF1-D332-4204-87C9-857C3838209B}" type="slidenum">
+              <a:rPr lang="en-US" smtClean="0"/>
+              <a:t>14</a:t>
             </a:fld>
             <a:endParaRPr lang="en-US"/>
           </a:p>
@@ -4431,20 +5102,62 @@
           <a:lstStyle/>
           <a:p>
             <a:r>
-              <a:rPr lang="en-US"/>
-              <a:t>After extracting features, normalization and PCA  were applied to these feature types. </a:t>
-            </a:r>
-          </a:p>
-          <a:p>
-            <a:r>
-              <a:rPr lang="en-US"/>
-              <a:t>In the next slide, I’d like to talk more about this red box.</a:t>
-            </a:r>
-          </a:p>
-          <a:p>
-            <a:r>
-              <a:rPr lang="en-US"/>
-              <a:t>Also, for comparing models, the accuracy was calculated.</a:t>
+              <a:rPr lang="en-US" dirty="0"/>
+              <a:t>Let start with the block diagram of the feature extraction. </a:t>
+            </a:r>
+          </a:p>
+          <a:p>
+            <a:r>
+              <a:rPr lang="en-US" dirty="0"/>
+              <a:t>As you can see, at first, I extracted the COP time series from each sample. </a:t>
+            </a:r>
+          </a:p>
+          <a:p>
+            <a:endParaRPr lang="en-US" dirty="0"/>
+          </a:p>
+          <a:p>
+            <a:r>
+              <a:rPr lang="en-US" dirty="0"/>
+              <a:t>in the next couple of slides, we can see these signals.</a:t>
+            </a:r>
+          </a:p>
+          <a:p>
+            <a:endParaRPr lang="en-US" dirty="0"/>
+          </a:p>
+          <a:p>
+            <a:r>
+              <a:rPr lang="en-US" dirty="0"/>
+              <a:t>Then these were passed through a low-pass filter. </a:t>
+            </a:r>
+          </a:p>
+          <a:p>
+            <a:r>
+              <a:rPr lang="en-US" dirty="0"/>
+              <a:t>with cut-off frequency of 5-Hz. </a:t>
+            </a:r>
+          </a:p>
+          <a:p>
+            <a:endParaRPr lang="en-US" dirty="0"/>
+          </a:p>
+          <a:p>
+            <a:r>
+              <a:rPr lang="en-US" dirty="0"/>
+              <a:t>Finally, 26 handcraft features were extracted.</a:t>
+            </a:r>
+          </a:p>
+          <a:p>
+            <a:r>
+              <a:rPr lang="en-US" dirty="0"/>
+              <a:t>So each 3D sample translated to a 26-element vector.</a:t>
+            </a:r>
+          </a:p>
+          <a:p>
+            <a:endParaRPr lang="en-US" dirty="0"/>
+          </a:p>
+          <a:p>
+            <a:r>
+              <a:rPr lang="en-US" dirty="0"/>
+              <a:t>+/-4.1 (18, 54) </a:t>
             </a:r>
           </a:p>
         </p:txBody>
@@ -4475,7 +5188,7 @@
     </p:spTree>
     <p:extLst>
       <p:ext uri="{BB962C8B-B14F-4D97-AF65-F5344CB8AC3E}">
-        <p14:creationId xmlns:p14="http://schemas.microsoft.com/office/powerpoint/2010/main" val="1166896941"/>
+        <p14:creationId xmlns:p14="http://schemas.microsoft.com/office/powerpoint/2010/main" val="3684750700"/>
       </p:ext>
     </p:extLst>
   </p:cSld>
@@ -4574,7 +5287,7 @@
     </p:spTree>
     <p:extLst>
       <p:ext uri="{BB962C8B-B14F-4D97-AF65-F5344CB8AC3E}">
-        <p14:creationId xmlns:p14="http://schemas.microsoft.com/office/powerpoint/2010/main" val="3088074233"/>
+        <p14:creationId xmlns:p14="http://schemas.microsoft.com/office/powerpoint/2010/main" val="1166896941"/>
       </p:ext>
     </p:extLst>
   </p:cSld>
@@ -4629,8 +5342,20 @@
           <a:lstStyle/>
           <a:p>
             <a:r>
-              <a:rPr lang="en-US" dirty="0"/>
-              <a:t>Here we can see the same method that I have used for the verification process.</a:t>
+              <a:rPr lang="en-US"/>
+              <a:t>After extracting features, normalization and PCA  were applied to these feature types. </a:t>
+            </a:r>
+          </a:p>
+          <a:p>
+            <a:r>
+              <a:rPr lang="en-US"/>
+              <a:t>In the next slide, I’d like to talk more about this red box.</a:t>
+            </a:r>
+          </a:p>
+          <a:p>
+            <a:r>
+              <a:rPr lang="en-US"/>
+              <a:t>Also, for comparing models, the accuracy was calculated.</a:t>
             </a:r>
           </a:p>
         </p:txBody>
@@ -4661,7 +5386,7 @@
     </p:spTree>
     <p:extLst>
       <p:ext uri="{BB962C8B-B14F-4D97-AF65-F5344CB8AC3E}">
-        <p14:creationId xmlns:p14="http://schemas.microsoft.com/office/powerpoint/2010/main" val="2868295120"/>
+        <p14:creationId xmlns:p14="http://schemas.microsoft.com/office/powerpoint/2010/main" val="3088074233"/>
       </p:ext>
     </p:extLst>
   </p:cSld>
@@ -4716,14 +5441,8 @@
           <a:lstStyle/>
           <a:p>
             <a:r>
-              <a:rPr lang="en-US"/>
-              <a:t>As I said before, our purpose is to compare several algorithms to find out which one has the best performance. </a:t>
-            </a:r>
-          </a:p>
-          <a:p>
-            <a:r>
-              <a:rPr lang="en-US"/>
-              <a:t>So, This table shows the search space for this worksheet. </a:t>
+              <a:rPr lang="en-US" dirty="0"/>
+              <a:t>Here we can see the same method that I have used for the verification process.</a:t>
             </a:r>
           </a:p>
         </p:txBody>
@@ -4754,7 +5473,7 @@
     </p:spTree>
     <p:extLst>
       <p:ext uri="{BB962C8B-B14F-4D97-AF65-F5344CB8AC3E}">
-        <p14:creationId xmlns:p14="http://schemas.microsoft.com/office/powerpoint/2010/main" val="3280513983"/>
+        <p14:creationId xmlns:p14="http://schemas.microsoft.com/office/powerpoint/2010/main" val="2868295120"/>
       </p:ext>
     </p:extLst>
   </p:cSld>
@@ -4810,29 +5529,14 @@
           <a:p>
             <a:r>
               <a:rPr lang="en-US"/>
-              <a:t>slide 28</a:t>
+              <a:t>As I said before, our purpose is to compare several algorithms to find out which one has the best performance. </a:t>
             </a:r>
           </a:p>
           <a:p>
             <a:r>
               <a:rPr lang="en-US"/>
-              <a:t>about PCA, the performance of models decreased since we lost some variance. </a:t>
-            </a:r>
-          </a:p>
-          <a:p>
-            <a:r>
-              <a:rPr lang="en-US"/>
-              <a:t>But I think keeping 95 percent could be a good choice </a:t>
-            </a:r>
-          </a:p>
-          <a:p>
-            <a:r>
-              <a:rPr lang="en-US"/>
-              <a:t>because it reduces feature space by about one-fourth with the same accuracy as without PCA.</a:t>
-            </a:r>
-          </a:p>
-          <a:p>
-            <a:endParaRPr lang="en-US"/>
+              <a:t>So, This table shows the search space for this worksheet. </a:t>
+            </a:r>
           </a:p>
         </p:txBody>
       </p:sp>
@@ -4862,7 +5566,7 @@
     </p:spTree>
     <p:extLst>
       <p:ext uri="{BB962C8B-B14F-4D97-AF65-F5344CB8AC3E}">
-        <p14:creationId xmlns:p14="http://schemas.microsoft.com/office/powerpoint/2010/main" val="3728638889"/>
+        <p14:creationId xmlns:p14="http://schemas.microsoft.com/office/powerpoint/2010/main" val="3280513983"/>
       </p:ext>
     </p:extLst>
   </p:cSld>
@@ -5017,13 +5721,13 @@
           <a:p>
             <a:r>
               <a:rPr lang="en-US"/>
-              <a:t>slide 31</a:t>
+              <a:t>slide 29 &amp; 30 </a:t>
             </a:r>
           </a:p>
           <a:p>
             <a:r>
               <a:rPr lang="en-US"/>
-              <a:t>about template matching, minimum distance has better accuracy and lower EER than median and average.</a:t>
+              <a:t>here is a boxplot of accuracy and ROC curve.</a:t>
             </a:r>
           </a:p>
           <a:p>
@@ -5060,7 +5764,7 @@
     </p:spTree>
     <p:extLst>
       <p:ext uri="{BB962C8B-B14F-4D97-AF65-F5344CB8AC3E}">
-        <p14:creationId xmlns:p14="http://schemas.microsoft.com/office/powerpoint/2010/main" val="831915820"/>
+        <p14:creationId xmlns:p14="http://schemas.microsoft.com/office/powerpoint/2010/main" val="2038378307"/>
       </p:ext>
     </p:extLst>
   </p:cSld>
@@ -5217,7 +5921,7 @@
           <a:p>
             <a:fld id="{9AD0187A-0930-4008-92CD-FC4D0CB4BDE6}" type="datetimeFigureOut">
               <a:rPr lang="en-US" smtClean="0"/>
-              <a:t>12/6/2021</a:t>
+              <a:t>12/7/2021</a:t>
             </a:fld>
             <a:endParaRPr lang="en-US"/>
           </a:p>
@@ -5415,7 +6119,7 @@
           <a:p>
             <a:fld id="{9AD0187A-0930-4008-92CD-FC4D0CB4BDE6}" type="datetimeFigureOut">
               <a:rPr lang="en-US" smtClean="0"/>
-              <a:t>12/6/2021</a:t>
+              <a:t>12/7/2021</a:t>
             </a:fld>
             <a:endParaRPr lang="en-US"/>
           </a:p>
@@ -5623,7 +6327,7 @@
           <a:p>
             <a:fld id="{9AD0187A-0930-4008-92CD-FC4D0CB4BDE6}" type="datetimeFigureOut">
               <a:rPr lang="en-US" smtClean="0"/>
-              <a:t>12/6/2021</a:t>
+              <a:t>12/7/2021</a:t>
             </a:fld>
             <a:endParaRPr lang="en-US"/>
           </a:p>
@@ -5821,7 +6525,7 @@
           <a:p>
             <a:fld id="{9AD0187A-0930-4008-92CD-FC4D0CB4BDE6}" type="datetimeFigureOut">
               <a:rPr lang="en-US" smtClean="0"/>
-              <a:t>12/6/2021</a:t>
+              <a:t>12/7/2021</a:t>
             </a:fld>
             <a:endParaRPr lang="en-US"/>
           </a:p>
@@ -6096,7 +6800,7 @@
           <a:p>
             <a:fld id="{9AD0187A-0930-4008-92CD-FC4D0CB4BDE6}" type="datetimeFigureOut">
               <a:rPr lang="en-US" smtClean="0"/>
-              <a:t>12/6/2021</a:t>
+              <a:t>12/7/2021</a:t>
             </a:fld>
             <a:endParaRPr lang="en-US"/>
           </a:p>
@@ -6361,7 +7065,7 @@
           <a:p>
             <a:fld id="{9AD0187A-0930-4008-92CD-FC4D0CB4BDE6}" type="datetimeFigureOut">
               <a:rPr lang="en-US" smtClean="0"/>
-              <a:t>12/6/2021</a:t>
+              <a:t>12/7/2021</a:t>
             </a:fld>
             <a:endParaRPr lang="en-US"/>
           </a:p>
@@ -6773,7 +7477,7 @@
           <a:p>
             <a:fld id="{9AD0187A-0930-4008-92CD-FC4D0CB4BDE6}" type="datetimeFigureOut">
               <a:rPr lang="en-US" smtClean="0"/>
-              <a:t>12/6/2021</a:t>
+              <a:t>12/7/2021</a:t>
             </a:fld>
             <a:endParaRPr lang="en-US"/>
           </a:p>
@@ -6914,7 +7618,7 @@
           <a:p>
             <a:fld id="{9AD0187A-0930-4008-92CD-FC4D0CB4BDE6}" type="datetimeFigureOut">
               <a:rPr lang="en-US" smtClean="0"/>
-              <a:t>12/6/2021</a:t>
+              <a:t>12/7/2021</a:t>
             </a:fld>
             <a:endParaRPr lang="en-US"/>
           </a:p>
@@ -7027,7 +7731,7 @@
           <a:p>
             <a:fld id="{9AD0187A-0930-4008-92CD-FC4D0CB4BDE6}" type="datetimeFigureOut">
               <a:rPr lang="en-US" smtClean="0"/>
-              <a:t>12/6/2021</a:t>
+              <a:t>12/7/2021</a:t>
             </a:fld>
             <a:endParaRPr lang="en-US"/>
           </a:p>
@@ -7338,7 +8042,7 @@
           <a:p>
             <a:fld id="{9AD0187A-0930-4008-92CD-FC4D0CB4BDE6}" type="datetimeFigureOut">
               <a:rPr lang="en-US" smtClean="0"/>
-              <a:t>12/6/2021</a:t>
+              <a:t>12/7/2021</a:t>
             </a:fld>
             <a:endParaRPr lang="en-US"/>
           </a:p>
@@ -7626,7 +8330,7 @@
           <a:p>
             <a:fld id="{9AD0187A-0930-4008-92CD-FC4D0CB4BDE6}" type="datetimeFigureOut">
               <a:rPr lang="en-US" smtClean="0"/>
-              <a:t>12/6/2021</a:t>
+              <a:t>12/7/2021</a:t>
             </a:fld>
             <a:endParaRPr lang="en-US"/>
           </a:p>
@@ -7867,7 +8571,7 @@
           <a:p>
             <a:fld id="{9AD0187A-0930-4008-92CD-FC4D0CB4BDE6}" type="datetimeFigureOut">
               <a:rPr lang="en-US" smtClean="0"/>
-              <a:t>12/6/2021</a:t>
+              <a:t>12/7/2021</a:t>
             </a:fld>
             <a:endParaRPr lang="en-US"/>
           </a:p>
@@ -8334,7 +9038,7 @@
         <p:spPr>
           <a:xfrm>
             <a:off x="1143800" y="3836953"/>
-            <a:ext cx="10234441" cy="1938992"/>
+            <a:ext cx="10234441" cy="830997"/>
           </a:xfrm>
           <a:prstGeom prst="rect">
             <a:avLst/>
@@ -8349,7 +9053,7 @@
           <a:p>
             <a:pPr algn="l" rtl="0" fontAlgn="base"/>
             <a:r>
-              <a:rPr lang="en-US" sz="2400" b="1" i="0" u="none" strike="noStrike">
+              <a:rPr lang="en-US" sz="2400" b="1" i="0" u="none" strike="noStrike" dirty="0">
                 <a:solidFill>
                   <a:srgbClr val="000000"/>
                 </a:solidFill>
@@ -8359,7 +9063,7 @@
               <a:t>Aim 1</a:t>
             </a:r>
             <a:r>
-              <a:rPr lang="en-US" sz="2400" i="0" u="none" strike="noStrike">
+              <a:rPr lang="en-US" sz="2400" i="0" u="none" strike="noStrike" dirty="0">
                 <a:solidFill>
                   <a:srgbClr val="000000"/>
                 </a:solidFill>
@@ -8369,29 +9073,16 @@
               <a:t>: To c</a:t>
             </a:r>
             <a:r>
-              <a:rPr lang="en-US" sz="2400">
+              <a:rPr lang="en-US" sz="2400" dirty="0">
                 <a:solidFill>
                   <a:srgbClr val="000000"/>
                 </a:solidFill>
                 <a:latin typeface="Segoe UI" panose="020B0502040204020203" pitchFamily="34" charset="0"/>
               </a:rPr>
-              <a:t>ompare two different methods used to compute similarity scores for a template matching method</a:t>
-            </a:r>
-          </a:p>
-          <a:p>
-            <a:pPr algn="l" rtl="0" fontAlgn="base"/>
-            <a:r>
-              <a:rPr lang="en-US" sz="2400" b="1" i="0" u="none" strike="noStrike">
-                <a:solidFill>
-                  <a:srgbClr val="000000"/>
-                </a:solidFill>
-                <a:effectLst/>
-                <a:latin typeface="Segoe UI" panose="020B0502040204020203" pitchFamily="34" charset="0"/>
-              </a:rPr>
-              <a:t>	   Euclidean distance vs. Correlation coefficient </a:t>
-            </a:r>
-            <a:r>
-              <a:rPr lang="en-US" sz="2400" b="0" i="0">
+              <a:t>ompare different Deep features </a:t>
+            </a:r>
+            <a:r>
+              <a:rPr lang="en-US" sz="2400" b="0" i="0" dirty="0">
                 <a:solidFill>
                   <a:srgbClr val="000000"/>
                 </a:solidFill>
@@ -8404,7 +9095,7 @@
           <a:p>
             <a:pPr algn="l" rtl="0" fontAlgn="base"/>
             <a:r>
-              <a:rPr lang="en-US" sz="2400" b="1">
+              <a:rPr lang="en-US" sz="2400" b="1" dirty="0">
                 <a:solidFill>
                   <a:srgbClr val="000000"/>
                 </a:solidFill>
@@ -8413,26 +9104,20 @@
               <a:t>Aim 2: </a:t>
             </a:r>
             <a:r>
-              <a:rPr lang="en-US" sz="2400">
+              <a:rPr lang="en-US" sz="2400" dirty="0">
                 <a:solidFill>
                   <a:srgbClr val="000000"/>
                 </a:solidFill>
                 <a:latin typeface="Segoe UI" panose="020B0502040204020203" pitchFamily="34" charset="0"/>
               </a:rPr>
-              <a:t>To compare two different feature types: </a:t>
-            </a:r>
-          </a:p>
-          <a:p>
-            <a:pPr algn="l" rtl="0" fontAlgn="base"/>
-            <a:r>
-              <a:rPr lang="en-US" sz="2400" b="1">
-                <a:solidFill>
-                  <a:srgbClr val="000000"/>
-                </a:solidFill>
-                <a:latin typeface="Segoe UI" panose="020B0502040204020203" pitchFamily="34" charset="0"/>
-              </a:rPr>
-              <a:t>            Center-of-pressure (COP) vs. Center-of-area (COA)</a:t>
-            </a:r>
+              <a:t>To compare conventional classifiers based on these features</a:t>
+            </a:r>
+            <a:endParaRPr lang="en-US" sz="2400" b="1" dirty="0">
+              <a:solidFill>
+                <a:srgbClr val="000000"/>
+              </a:solidFill>
+              <a:latin typeface="Segoe UI" panose="020B0502040204020203" pitchFamily="34" charset="0"/>
+            </a:endParaRPr>
           </a:p>
         </p:txBody>
       </p:sp>
@@ -8470,7 +9155,7 @@
                   <a:srgbClr val="000000"/>
                 </a:solidFill>
               </a:rPr>
-              <a:t>In this worksheet, a several classifications were developed for person verification using CASIA-D Dataset.</a:t>
+              <a:t>In this presentation, a several classifiers were developed for person verification using Deep features.</a:t>
             </a:r>
             <a:endParaRPr lang="en-US" sz="2800" dirty="0"/>
           </a:p>
@@ -8506,44 +9191,12 @@
           <a:chExt cx="0" cy="0"/>
         </a:xfrm>
       </p:grpSpPr>
-      <p:sp>
-        <p:nvSpPr>
-          <p:cNvPr id="4" name="Title 3">
-            <a:extLst>
-              <a:ext uri="{FF2B5EF4-FFF2-40B4-BE49-F238E27FC236}">
-                <a16:creationId xmlns:a16="http://schemas.microsoft.com/office/drawing/2014/main" id="{65AF4CC0-ECF4-4FE1-B5A7-4F54A87D60EE}"/>
-              </a:ext>
-            </a:extLst>
-          </p:cNvPr>
-          <p:cNvSpPr>
-            <a:spLocks noGrp="1"/>
-          </p:cNvSpPr>
-          <p:nvPr>
-            <p:ph type="title"/>
-          </p:nvPr>
-        </p:nvSpPr>
-        <p:spPr/>
-        <p:txBody>
-          <a:bodyPr/>
-          <a:lstStyle/>
-          <a:p>
-            <a:r>
-              <a:rPr lang="en-US" sz="4400" b="1" i="0">
-                <a:effectLst/>
-                <a:latin typeface="Segoe "/>
-              </a:rPr>
-              <a:t>Template Matching Criterion​</a:t>
-            </a:r>
-            <a:endParaRPr lang="en-US"/>
-          </a:p>
-        </p:txBody>
-      </p:sp>
       <p:pic>
         <p:nvPicPr>
-          <p:cNvPr id="7" name="Picture 6">
-            <a:extLst>
-              <a:ext uri="{FF2B5EF4-FFF2-40B4-BE49-F238E27FC236}">
-                <a16:creationId xmlns:a16="http://schemas.microsoft.com/office/drawing/2014/main" id="{894FDFA9-914A-4815-8B07-257369AC3404}"/>
+          <p:cNvPr id="8" name="Picture 7">
+            <a:extLst>
+              <a:ext uri="{FF2B5EF4-FFF2-40B4-BE49-F238E27FC236}">
+                <a16:creationId xmlns:a16="http://schemas.microsoft.com/office/drawing/2014/main" id="{B38860AD-4884-4542-9EA4-57B39B58C5AE}"/>
               </a:ext>
             </a:extLst>
           </p:cNvPr>
@@ -8565,8 +9218,8 @@
         </p:blipFill>
         <p:spPr>
           <a:xfrm>
-            <a:off x="1846847" y="1347537"/>
-            <a:ext cx="8498303" cy="4856173"/>
+            <a:off x="5850193" y="836583"/>
+            <a:ext cx="6108642" cy="5794431"/>
           </a:xfrm>
           <a:prstGeom prst="rect">
             <a:avLst/>
@@ -8575,56 +9228,74 @@
       </p:pic>
       <p:sp>
         <p:nvSpPr>
-          <p:cNvPr id="5" name="TextBox 4">
-            <a:extLst>
-              <a:ext uri="{FF2B5EF4-FFF2-40B4-BE49-F238E27FC236}">
-                <a16:creationId xmlns:a16="http://schemas.microsoft.com/office/drawing/2014/main" id="{3710FC95-60E9-42BC-927E-57FCDE7E1D0C}"/>
-              </a:ext>
-            </a:extLst>
-          </p:cNvPr>
-          <p:cNvSpPr txBox="1"/>
+          <p:cNvPr id="4" name="Title 3">
+            <a:extLst>
+              <a:ext uri="{FF2B5EF4-FFF2-40B4-BE49-F238E27FC236}">
+                <a16:creationId xmlns:a16="http://schemas.microsoft.com/office/drawing/2014/main" id="{65AF4CC0-ECF4-4FE1-B5A7-4F54A87D60EE}"/>
+              </a:ext>
+            </a:extLst>
+          </p:cNvPr>
+          <p:cNvSpPr>
+            <a:spLocks noGrp="1"/>
+          </p:cNvSpPr>
+          <p:nvPr>
+            <p:ph type="title"/>
+          </p:nvPr>
+        </p:nvSpPr>
+        <p:spPr/>
+        <p:txBody>
+          <a:bodyPr/>
+          <a:lstStyle/>
+          <a:p>
+            <a:r>
+              <a:rPr lang="en-US" b="1" dirty="0">
+                <a:latin typeface="Segoe "/>
+              </a:rPr>
+              <a:t>VGG16</a:t>
+            </a:r>
+            <a:endParaRPr lang="en-US" dirty="0"/>
+          </a:p>
+        </p:txBody>
+      </p:sp>
+      <p:pic>
+        <p:nvPicPr>
+          <p:cNvPr id="3" name="Picture 2" descr="Text&#10;&#10;Description automatically generated">
+            <a:extLst>
+              <a:ext uri="{FF2B5EF4-FFF2-40B4-BE49-F238E27FC236}">
+                <a16:creationId xmlns:a16="http://schemas.microsoft.com/office/drawing/2014/main" id="{BD06F998-3C9C-4F1C-8B3E-77F93ACFE40E}"/>
+              </a:ext>
+            </a:extLst>
+          </p:cNvPr>
+          <p:cNvPicPr>
+            <a:picLocks noChangeAspect="1"/>
+          </p:cNvPicPr>
           <p:nvPr/>
-        </p:nvSpPr>
+        </p:nvPicPr>
+        <p:blipFill rotWithShape="1">
+          <a:blip r:embed="rId4">
+            <a:extLst>
+              <a:ext uri="{28A0092B-C50C-407E-A947-70E740481C1C}">
+                <a14:useLocalDpi xmlns:a14="http://schemas.microsoft.com/office/drawing/2010/main" val="0"/>
+              </a:ext>
+            </a:extLst>
+          </a:blip>
+          <a:srcRect l="20593" t="44285" r="51639" b="20318"/>
+          <a:stretch/>
+        </p:blipFill>
         <p:spPr>
           <a:xfrm>
-            <a:off x="-1425" y="6396335"/>
-            <a:ext cx="6097424" cy="461665"/>
+            <a:off x="838200" y="2109335"/>
+            <a:ext cx="4855554" cy="3759682"/>
           </a:xfrm>
           <a:prstGeom prst="rect">
             <a:avLst/>
           </a:prstGeom>
-          <a:noFill/>
         </p:spPr>
-        <p:txBody>
-          <a:bodyPr wrap="square">
-            <a:spAutoFit/>
-          </a:bodyPr>
-          <a:lstStyle/>
-          <a:p>
-            <a:pPr>
-              <a:spcBef>
-                <a:spcPts val="0"/>
-              </a:spcBef>
-              <a:spcAft>
-                <a:spcPts val="0"/>
-              </a:spcAft>
-            </a:pPr>
-            <a:r>
-              <a:rPr lang="en-US" sz="1200">
-                <a:solidFill>
-                  <a:srgbClr val="0E101A"/>
-                </a:solidFill>
-                <a:effectLst/>
-              </a:rPr>
-              <a:t>For each subject, two models were developed, left and right. As a result, we have 2*96 models, and these two plots are obtained from the average of FAR and FRR in these models.</a:t>
-            </a:r>
-          </a:p>
-        </p:txBody>
-      </p:sp>
+      </p:pic>
     </p:spTree>
     <p:extLst>
       <p:ext uri="{BB962C8B-B14F-4D97-AF65-F5344CB8AC3E}">
-        <p14:creationId xmlns:p14="http://schemas.microsoft.com/office/powerpoint/2010/main" val="3347751766"/>
+        <p14:creationId xmlns:p14="http://schemas.microsoft.com/office/powerpoint/2010/main" val="1751844243"/>
       </p:ext>
     </p:extLst>
   </p:cSld>
@@ -8651,6 +9322,445 @@
           <a:chExt cx="0" cy="0"/>
         </a:xfrm>
       </p:grpSpPr>
+      <p:pic>
+        <p:nvPicPr>
+          <p:cNvPr id="8" name="Picture 7">
+            <a:extLst>
+              <a:ext uri="{FF2B5EF4-FFF2-40B4-BE49-F238E27FC236}">
+                <a16:creationId xmlns:a16="http://schemas.microsoft.com/office/drawing/2014/main" id="{B38860AD-4884-4542-9EA4-57B39B58C5AE}"/>
+              </a:ext>
+            </a:extLst>
+          </p:cNvPr>
+          <p:cNvPicPr>
+            <a:picLocks noChangeAspect="1"/>
+          </p:cNvPicPr>
+          <p:nvPr/>
+        </p:nvPicPr>
+        <p:blipFill>
+          <a:blip r:embed="rId3">
+            <a:extLst>
+              <a:ext uri="{28A0092B-C50C-407E-A947-70E740481C1C}">
+                <a14:useLocalDpi xmlns:a14="http://schemas.microsoft.com/office/drawing/2010/main" val="0"/>
+              </a:ext>
+            </a:extLst>
+          </a:blip>
+          <a:srcRect/>
+          <a:stretch/>
+        </p:blipFill>
+        <p:spPr>
+          <a:xfrm>
+            <a:off x="5862385" y="2247868"/>
+            <a:ext cx="6108642" cy="3681547"/>
+          </a:xfrm>
+          <a:prstGeom prst="rect">
+            <a:avLst/>
+          </a:prstGeom>
+        </p:spPr>
+      </p:pic>
+      <p:sp>
+        <p:nvSpPr>
+          <p:cNvPr id="4" name="Title 3">
+            <a:extLst>
+              <a:ext uri="{FF2B5EF4-FFF2-40B4-BE49-F238E27FC236}">
+                <a16:creationId xmlns:a16="http://schemas.microsoft.com/office/drawing/2014/main" id="{65AF4CC0-ECF4-4FE1-B5A7-4F54A87D60EE}"/>
+              </a:ext>
+            </a:extLst>
+          </p:cNvPr>
+          <p:cNvSpPr>
+            <a:spLocks noGrp="1"/>
+          </p:cNvSpPr>
+          <p:nvPr>
+            <p:ph type="title"/>
+          </p:nvPr>
+        </p:nvSpPr>
+        <p:spPr/>
+        <p:txBody>
+          <a:bodyPr/>
+          <a:lstStyle/>
+          <a:p>
+            <a:r>
+              <a:rPr lang="en-US" b="1" dirty="0" err="1">
+                <a:latin typeface="Segoe "/>
+              </a:rPr>
+              <a:t>Efficientnet</a:t>
+            </a:r>
+            <a:endParaRPr lang="en-US" dirty="0"/>
+          </a:p>
+        </p:txBody>
+      </p:sp>
+      <p:pic>
+        <p:nvPicPr>
+          <p:cNvPr id="5" name="Picture 4" descr="Graphical user interface, text&#10;&#10;Description automatically generated">
+            <a:extLst>
+              <a:ext uri="{FF2B5EF4-FFF2-40B4-BE49-F238E27FC236}">
+                <a16:creationId xmlns:a16="http://schemas.microsoft.com/office/drawing/2014/main" id="{B00F83D9-5BF2-4F7D-BC1D-F2CEFE2D86F0}"/>
+              </a:ext>
+            </a:extLst>
+          </p:cNvPr>
+          <p:cNvPicPr>
+            <a:picLocks noChangeAspect="1"/>
+          </p:cNvPicPr>
+          <p:nvPr/>
+        </p:nvPicPr>
+        <p:blipFill rotWithShape="1">
+          <a:blip r:embed="rId4">
+            <a:extLst>
+              <a:ext uri="{28A0092B-C50C-407E-A947-70E740481C1C}">
+                <a14:useLocalDpi xmlns:a14="http://schemas.microsoft.com/office/drawing/2010/main" val="0"/>
+              </a:ext>
+            </a:extLst>
+          </a:blip>
+          <a:srcRect l="20627" t="38043" r="52177" b="35290"/>
+          <a:stretch/>
+        </p:blipFill>
+        <p:spPr>
+          <a:xfrm>
+            <a:off x="838200" y="2711891"/>
+            <a:ext cx="4622925" cy="2753503"/>
+          </a:xfrm>
+          <a:prstGeom prst="rect">
+            <a:avLst/>
+          </a:prstGeom>
+        </p:spPr>
+      </p:pic>
+    </p:spTree>
+    <p:extLst>
+      <p:ext uri="{BB962C8B-B14F-4D97-AF65-F5344CB8AC3E}">
+        <p14:creationId xmlns:p14="http://schemas.microsoft.com/office/powerpoint/2010/main" val="3697398340"/>
+      </p:ext>
+    </p:extLst>
+  </p:cSld>
+  <p:clrMapOvr>
+    <a:masterClrMapping/>
+  </p:clrMapOvr>
+</p:sld>
+</file>
+
+<file path=ppt/slides/slide12.xml><?xml version="1.0" encoding="utf-8"?>
+<p:sld xmlns:a="http://schemas.openxmlformats.org/drawingml/2006/main" xmlns:r="http://schemas.openxmlformats.org/officeDocument/2006/relationships" xmlns:p="http://schemas.openxmlformats.org/presentationml/2006/main">
+  <p:cSld>
+    <p:spTree>
+      <p:nvGrpSpPr>
+        <p:cNvPr id="1" name=""/>
+        <p:cNvGrpSpPr/>
+        <p:nvPr/>
+      </p:nvGrpSpPr>
+      <p:grpSpPr>
+        <a:xfrm>
+          <a:off x="0" y="0"/>
+          <a:ext cx="0" cy="0"/>
+          <a:chOff x="0" y="0"/>
+          <a:chExt cx="0" cy="0"/>
+        </a:xfrm>
+      </p:grpSpPr>
+      <p:pic>
+        <p:nvPicPr>
+          <p:cNvPr id="8" name="Picture 7">
+            <a:extLst>
+              <a:ext uri="{FF2B5EF4-FFF2-40B4-BE49-F238E27FC236}">
+                <a16:creationId xmlns:a16="http://schemas.microsoft.com/office/drawing/2014/main" id="{B38860AD-4884-4542-9EA4-57B39B58C5AE}"/>
+              </a:ext>
+            </a:extLst>
+          </p:cNvPr>
+          <p:cNvPicPr>
+            <a:picLocks noChangeAspect="1"/>
+          </p:cNvPicPr>
+          <p:nvPr/>
+        </p:nvPicPr>
+        <p:blipFill>
+          <a:blip r:embed="rId3">
+            <a:extLst>
+              <a:ext uri="{28A0092B-C50C-407E-A947-70E740481C1C}">
+                <a14:useLocalDpi xmlns:a14="http://schemas.microsoft.com/office/drawing/2010/main" val="0"/>
+              </a:ext>
+            </a:extLst>
+          </a:blip>
+          <a:srcRect/>
+          <a:stretch/>
+        </p:blipFill>
+        <p:spPr>
+          <a:xfrm>
+            <a:off x="6717855" y="1690688"/>
+            <a:ext cx="4921401" cy="4591844"/>
+          </a:xfrm>
+          <a:prstGeom prst="rect">
+            <a:avLst/>
+          </a:prstGeom>
+        </p:spPr>
+      </p:pic>
+      <p:sp>
+        <p:nvSpPr>
+          <p:cNvPr id="4" name="Title 3">
+            <a:extLst>
+              <a:ext uri="{FF2B5EF4-FFF2-40B4-BE49-F238E27FC236}">
+                <a16:creationId xmlns:a16="http://schemas.microsoft.com/office/drawing/2014/main" id="{65AF4CC0-ECF4-4FE1-B5A7-4F54A87D60EE}"/>
+              </a:ext>
+            </a:extLst>
+          </p:cNvPr>
+          <p:cNvSpPr>
+            <a:spLocks noGrp="1"/>
+          </p:cNvSpPr>
+          <p:nvPr>
+            <p:ph type="title"/>
+          </p:nvPr>
+        </p:nvSpPr>
+        <p:spPr/>
+        <p:txBody>
+          <a:bodyPr/>
+          <a:lstStyle/>
+          <a:p>
+            <a:r>
+              <a:rPr lang="en-US" b="1" dirty="0">
+                <a:latin typeface="Segoe "/>
+              </a:rPr>
+              <a:t>InceptionV3</a:t>
+            </a:r>
+            <a:endParaRPr lang="en-US" dirty="0"/>
+          </a:p>
+        </p:txBody>
+      </p:sp>
+      <p:pic>
+        <p:nvPicPr>
+          <p:cNvPr id="6" name="Picture 5" descr="Graphical user interface, text&#10;&#10;Description automatically generated">
+            <a:extLst>
+              <a:ext uri="{FF2B5EF4-FFF2-40B4-BE49-F238E27FC236}">
+                <a16:creationId xmlns:a16="http://schemas.microsoft.com/office/drawing/2014/main" id="{7E4CEE22-49A6-44FB-B132-42A4B34C873F}"/>
+              </a:ext>
+            </a:extLst>
+          </p:cNvPr>
+          <p:cNvPicPr>
+            <a:picLocks noChangeAspect="1"/>
+          </p:cNvPicPr>
+          <p:nvPr/>
+        </p:nvPicPr>
+        <p:blipFill rotWithShape="1">
+          <a:blip r:embed="rId4">
+            <a:extLst>
+              <a:ext uri="{28A0092B-C50C-407E-A947-70E740481C1C}">
+                <a14:useLocalDpi xmlns:a14="http://schemas.microsoft.com/office/drawing/2010/main" val="0"/>
+              </a:ext>
+            </a:extLst>
+          </a:blip>
+          <a:srcRect l="20735" t="44267" r="51236" b="20178"/>
+          <a:stretch/>
+        </p:blipFill>
+        <p:spPr>
+          <a:xfrm>
+            <a:off x="838200" y="2247868"/>
+            <a:ext cx="4635947" cy="3572256"/>
+          </a:xfrm>
+          <a:prstGeom prst="rect">
+            <a:avLst/>
+          </a:prstGeom>
+        </p:spPr>
+      </p:pic>
+    </p:spTree>
+    <p:extLst>
+      <p:ext uri="{BB962C8B-B14F-4D97-AF65-F5344CB8AC3E}">
+        <p14:creationId xmlns:p14="http://schemas.microsoft.com/office/powerpoint/2010/main" val="987431538"/>
+      </p:ext>
+    </p:extLst>
+  </p:cSld>
+  <p:clrMapOvr>
+    <a:masterClrMapping/>
+  </p:clrMapOvr>
+</p:sld>
+</file>
+
+<file path=ppt/slides/slide13.xml><?xml version="1.0" encoding="utf-8"?>
+<p:sld xmlns:a="http://schemas.openxmlformats.org/drawingml/2006/main" xmlns:r="http://schemas.openxmlformats.org/officeDocument/2006/relationships" xmlns:p="http://schemas.openxmlformats.org/presentationml/2006/main">
+  <p:cSld>
+    <p:spTree>
+      <p:nvGrpSpPr>
+        <p:cNvPr id="1" name=""/>
+        <p:cNvGrpSpPr/>
+        <p:nvPr/>
+      </p:nvGrpSpPr>
+      <p:grpSpPr>
+        <a:xfrm>
+          <a:off x="0" y="0"/>
+          <a:ext cx="0" cy="0"/>
+          <a:chOff x="0" y="0"/>
+          <a:chExt cx="0" cy="0"/>
+        </a:xfrm>
+      </p:grpSpPr>
+      <p:sp>
+        <p:nvSpPr>
+          <p:cNvPr id="4" name="Title 3">
+            <a:extLst>
+              <a:ext uri="{FF2B5EF4-FFF2-40B4-BE49-F238E27FC236}">
+                <a16:creationId xmlns:a16="http://schemas.microsoft.com/office/drawing/2014/main" id="{65AF4CC0-ECF4-4FE1-B5A7-4F54A87D60EE}"/>
+              </a:ext>
+            </a:extLst>
+          </p:cNvPr>
+          <p:cNvSpPr>
+            <a:spLocks noGrp="1"/>
+          </p:cNvSpPr>
+          <p:nvPr>
+            <p:ph type="title"/>
+          </p:nvPr>
+        </p:nvSpPr>
+        <p:spPr>
+          <a:xfrm>
+            <a:off x="838200" y="-142875"/>
+            <a:ext cx="10515600" cy="1325563"/>
+          </a:xfrm>
+        </p:spPr>
+        <p:txBody>
+          <a:bodyPr/>
+          <a:lstStyle/>
+          <a:p>
+            <a:r>
+              <a:rPr lang="en-US" b="1" dirty="0">
+                <a:latin typeface="Segoe "/>
+              </a:rPr>
+              <a:t>Deep features</a:t>
+            </a:r>
+          </a:p>
+        </p:txBody>
+      </p:sp>
+      <p:sp>
+        <p:nvSpPr>
+          <p:cNvPr id="3" name="TextBox 2">
+            <a:extLst>
+              <a:ext uri="{FF2B5EF4-FFF2-40B4-BE49-F238E27FC236}">
+                <a16:creationId xmlns:a16="http://schemas.microsoft.com/office/drawing/2014/main" id="{9F006398-122C-4948-A849-C986999B3E10}"/>
+              </a:ext>
+            </a:extLst>
+          </p:cNvPr>
+          <p:cNvSpPr txBox="1"/>
+          <p:nvPr/>
+        </p:nvSpPr>
+        <p:spPr>
+          <a:xfrm>
+            <a:off x="1543319" y="3543056"/>
+            <a:ext cx="3074675" cy="1815882"/>
+          </a:xfrm>
+          <a:prstGeom prst="rect">
+            <a:avLst/>
+          </a:prstGeom>
+          <a:noFill/>
+        </p:spPr>
+        <p:txBody>
+          <a:bodyPr wrap="square" lIns="91440" tIns="45720" rIns="91440" bIns="45720" anchor="t">
+            <a:spAutoFit/>
+          </a:bodyPr>
+          <a:lstStyle/>
+          <a:p>
+            <a:r>
+              <a:rPr lang="en-US" sz="1600" i="1" dirty="0"/>
+              <a:t>Statistical test: Mann-Whitney</a:t>
+            </a:r>
+          </a:p>
+          <a:p>
+            <a:endParaRPr lang="en-US" sz="1600" i="1" dirty="0"/>
+          </a:p>
+          <a:p>
+            <a:endParaRPr lang="en-US" sz="1600" i="1" dirty="0"/>
+          </a:p>
+          <a:p>
+            <a:r>
+              <a:rPr lang="en-US" sz="1600" dirty="0">
+                <a:ea typeface="+mn-lt"/>
+                <a:cs typeface="+mn-lt"/>
+              </a:rPr>
+              <a:t>p-value annotation legend:</a:t>
+            </a:r>
+          </a:p>
+          <a:p>
+            <a:r>
+              <a:rPr lang="en-US" sz="1600" dirty="0">
+                <a:ea typeface="+mn-lt"/>
+                <a:cs typeface="+mn-lt"/>
+              </a:rPr>
+              <a:t>ns: 5.00e-02 &lt; p &lt;= 1.00e+00</a:t>
+            </a:r>
+          </a:p>
+          <a:p>
+            <a:r>
+              <a:rPr lang="en-US" sz="1600" dirty="0">
+                <a:ea typeface="+mn-lt"/>
+                <a:cs typeface="+mn-lt"/>
+              </a:rPr>
+              <a:t>*: 1.00e-02 &lt; p &lt;= 5.00e-02</a:t>
+            </a:r>
+          </a:p>
+          <a:p>
+            <a:r>
+              <a:rPr lang="en-US" sz="1600" dirty="0">
+                <a:ea typeface="+mn-lt"/>
+                <a:cs typeface="+mn-lt"/>
+              </a:rPr>
+              <a:t>****: p &lt;= 1.00e-04</a:t>
+            </a:r>
+          </a:p>
+        </p:txBody>
+      </p:sp>
+      <p:pic>
+        <p:nvPicPr>
+          <p:cNvPr id="7" name="Picture 6">
+            <a:extLst>
+              <a:ext uri="{FF2B5EF4-FFF2-40B4-BE49-F238E27FC236}">
+                <a16:creationId xmlns:a16="http://schemas.microsoft.com/office/drawing/2014/main" id="{BC654F08-5B6A-4D6B-A9AE-F68F3303698A}"/>
+              </a:ext>
+            </a:extLst>
+          </p:cNvPr>
+          <p:cNvPicPr>
+            <a:picLocks noChangeAspect="1"/>
+          </p:cNvPicPr>
+          <p:nvPr/>
+        </p:nvPicPr>
+        <p:blipFill>
+          <a:blip r:embed="rId3">
+            <a:extLst>
+              <a:ext uri="{28A0092B-C50C-407E-A947-70E740481C1C}">
+                <a14:useLocalDpi xmlns:a14="http://schemas.microsoft.com/office/drawing/2010/main" val="0"/>
+              </a:ext>
+            </a:extLst>
+          </a:blip>
+          <a:srcRect/>
+          <a:stretch/>
+        </p:blipFill>
+        <p:spPr>
+          <a:xfrm>
+            <a:off x="5867399" y="382108"/>
+            <a:ext cx="4960257" cy="6321896"/>
+          </a:xfrm>
+          <a:prstGeom prst="rect">
+            <a:avLst/>
+          </a:prstGeom>
+        </p:spPr>
+      </p:pic>
+    </p:spTree>
+    <p:extLst>
+      <p:ext uri="{BB962C8B-B14F-4D97-AF65-F5344CB8AC3E}">
+        <p14:creationId xmlns:p14="http://schemas.microsoft.com/office/powerpoint/2010/main" val="1968424929"/>
+      </p:ext>
+    </p:extLst>
+  </p:cSld>
+  <p:clrMapOvr>
+    <a:masterClrMapping/>
+  </p:clrMapOvr>
+</p:sld>
+</file>
+
+<file path=ppt/slides/slide14.xml><?xml version="1.0" encoding="utf-8"?>
+<p:sld xmlns:a="http://schemas.openxmlformats.org/drawingml/2006/main" xmlns:r="http://schemas.openxmlformats.org/officeDocument/2006/relationships" xmlns:p="http://schemas.openxmlformats.org/presentationml/2006/main">
+  <p:cSld>
+    <p:spTree>
+      <p:nvGrpSpPr>
+        <p:cNvPr id="1" name=""/>
+        <p:cNvGrpSpPr/>
+        <p:nvPr/>
+      </p:nvGrpSpPr>
+      <p:grpSpPr>
+        <a:xfrm>
+          <a:off x="0" y="0"/>
+          <a:ext cx="0" cy="0"/>
+          <a:chOff x="0" y="0"/>
+          <a:chExt cx="0" cy="0"/>
+        </a:xfrm>
+      </p:grpSpPr>
       <p:sp>
         <p:nvSpPr>
           <p:cNvPr id="2" name="Title 1">
@@ -8710,87 +9820,97 @@
         </p:spPr>
         <p:txBody>
           <a:bodyPr>
-            <a:normAutofit fontScale="92500" lnSpcReduction="20000"/>
+            <a:normAutofit/>
           </a:bodyPr>
           <a:lstStyle/>
           <a:p>
             <a:r>
-              <a:rPr lang="en-US" b="1">
+              <a:rPr lang="en-US" b="1" dirty="0">
                 <a:latin typeface="Segoe "/>
               </a:rPr>
-              <a:t>Minimum distance </a:t>
-            </a:r>
-            <a:r>
-              <a:rPr lang="en-US">
+              <a:t>SVM </a:t>
+            </a:r>
+            <a:r>
+              <a:rPr lang="en-US" dirty="0">
                 <a:latin typeface="Segoe "/>
               </a:rPr>
-              <a:t>has a better result than median and average.</a:t>
-            </a:r>
-          </a:p>
-          <a:p>
-            <a:r>
-              <a:rPr lang="en-US">
+              <a:t>has a better result than TM and KNN.</a:t>
+            </a:r>
+          </a:p>
+          <a:p>
+            <a:r>
+              <a:rPr lang="en-US" dirty="0">
                 <a:latin typeface="Segoe "/>
               </a:rPr>
-              <a:t>Although applying PCA has reduced the accuracy, It was selected since it reduced the feature space.</a:t>
-            </a:r>
-          </a:p>
-          <a:p>
-            <a:r>
-              <a:rPr lang="en-US">
-                <a:latin typeface="Segoe "/>
-              </a:rPr>
-              <a:t>In time-series, the number of features with keeping 95% variance decreased from 300 to about 16.</a:t>
-            </a:r>
-          </a:p>
-          <a:p>
-            <a:r>
-              <a:rPr lang="en-US">
-                <a:latin typeface="Segoe "/>
-              </a:rPr>
-              <a:t>In handcraft features, the number of features with keeping 95% variance decreased from 26 to about 6.</a:t>
-            </a:r>
-          </a:p>
-          <a:p>
-            <a:r>
-              <a:rPr lang="en-US" b="1">
+              <a:t>PCA with keeping 95% was applied since it reduced the feature space.</a:t>
+            </a:r>
+          </a:p>
+          <a:p>
+            <a:r>
+              <a:rPr lang="en-US" b="1" dirty="0">
                 <a:latin typeface="Segoe "/>
               </a:rPr>
               <a:t>Z-score</a:t>
             </a:r>
             <a:r>
-              <a:rPr lang="en-US">
+              <a:rPr lang="en-US" dirty="0">
                 <a:latin typeface="Segoe "/>
               </a:rPr>
-              <a:t> has a better result in comparison with Min-Max.</a:t>
-            </a:r>
-          </a:p>
-          <a:p>
-            <a:r>
-              <a:rPr lang="en-US" b="1">
+              <a:t> has been applied on all features.</a:t>
+            </a:r>
+          </a:p>
+          <a:p>
+            <a:r>
+              <a:rPr lang="en-US" b="1" dirty="0">
                 <a:latin typeface="Segoe "/>
               </a:rPr>
               <a:t>30% test size</a:t>
             </a:r>
             <a:r>
-              <a:rPr lang="en-US">
+              <a:rPr lang="en-US" dirty="0">
                 <a:latin typeface="Segoe "/>
               </a:rPr>
-              <a:t> provided a good trade-off between test samples and accuracy.</a:t>
-            </a:r>
-          </a:p>
-          <a:p>
-            <a:r>
-              <a:rPr lang="en-US" b="1">
+              <a:t> provided for calculating the accuracy.</a:t>
+            </a:r>
+          </a:p>
+          <a:p>
+            <a:r>
+              <a:rPr lang="en-US" b="1" dirty="0">
                 <a:latin typeface="Segoe "/>
               </a:rPr>
-              <a:t>COA Time-Series </a:t>
-            </a:r>
-            <a:r>
-              <a:rPr lang="en-US">
+              <a:t>VGG16 </a:t>
+            </a:r>
+            <a:r>
+              <a:rPr lang="en-US" dirty="0">
                 <a:latin typeface="Segoe "/>
               </a:rPr>
-              <a:t>has better results in comparison with other types of features.</a:t>
+              <a:t>and</a:t>
+            </a:r>
+            <a:r>
+              <a:rPr lang="en-US" b="1" dirty="0">
+                <a:latin typeface="Segoe "/>
+              </a:rPr>
+              <a:t> Resnet50 </a:t>
+            </a:r>
+            <a:r>
+              <a:rPr lang="en-US" dirty="0">
+                <a:latin typeface="Segoe "/>
+              </a:rPr>
+              <a:t>have the best performance on all classifiers.</a:t>
+            </a:r>
+          </a:p>
+          <a:p>
+            <a:r>
+              <a:rPr lang="en-US" b="1" dirty="0">
+                <a:latin typeface="Segoe "/>
+              </a:rPr>
+              <a:t>KNN</a:t>
+            </a:r>
+            <a:r>
+              <a:rPr lang="en-US" dirty="0">
+                <a:latin typeface="Segoe "/>
+              </a:rPr>
+              <a:t> has the worse results.</a:t>
             </a:r>
           </a:p>
         </p:txBody>
@@ -9476,7 +10596,7 @@
                 </a:solidFill>
                 <a:latin typeface="Segoe "/>
               </a:rPr>
-              <a:t>CD, PTI, </a:t>
+              <a:t>Pre-features are CD, PTI, </a:t>
             </a:r>
             <a:r>
               <a:rPr lang="en-US" sz="2000" i="1" dirty="0" err="1">
@@ -9580,6 +10700,314 @@
 </file>
 
 <file path=ppt/slides/slide3.xml><?xml version="1.0" encoding="utf-8"?>
+<p:sld xmlns:a="http://schemas.openxmlformats.org/drawingml/2006/main" xmlns:r="http://schemas.openxmlformats.org/officeDocument/2006/relationships" xmlns:p="http://schemas.openxmlformats.org/presentationml/2006/main">
+  <p:cSld>
+    <p:spTree>
+      <p:nvGrpSpPr>
+        <p:cNvPr id="1" name=""/>
+        <p:cNvGrpSpPr/>
+        <p:nvPr/>
+      </p:nvGrpSpPr>
+      <p:grpSpPr>
+        <a:xfrm>
+          <a:off x="0" y="0"/>
+          <a:ext cx="0" cy="0"/>
+          <a:chOff x="0" y="0"/>
+          <a:chExt cx="0" cy="0"/>
+        </a:xfrm>
+      </p:grpSpPr>
+      <p:sp>
+        <p:nvSpPr>
+          <p:cNvPr id="2" name="Title 1">
+            <a:extLst>
+              <a:ext uri="{FF2B5EF4-FFF2-40B4-BE49-F238E27FC236}">
+                <a16:creationId xmlns:a16="http://schemas.microsoft.com/office/drawing/2014/main" id="{C8113EB8-F0B3-4247-9F1D-B773FB0330CC}"/>
+              </a:ext>
+            </a:extLst>
+          </p:cNvPr>
+          <p:cNvSpPr>
+            <a:spLocks noGrp="1"/>
+          </p:cNvSpPr>
+          <p:nvPr>
+            <p:ph type="title"/>
+          </p:nvPr>
+        </p:nvSpPr>
+        <p:spPr>
+          <a:xfrm>
+            <a:off x="558799" y="365125"/>
+            <a:ext cx="11428762" cy="1325563"/>
+          </a:xfrm>
+        </p:spPr>
+        <p:txBody>
+          <a:bodyPr>
+            <a:normAutofit/>
+          </a:bodyPr>
+          <a:lstStyle/>
+          <a:p>
+            <a:r>
+              <a:rPr lang="en-US" sz="4000" b="1" i="0" u="none" strike="noStrike" dirty="0">
+                <a:solidFill>
+                  <a:srgbClr val="242424"/>
+                </a:solidFill>
+                <a:effectLst/>
+                <a:latin typeface="Segoe UI" panose="020B0502040204020203" pitchFamily="34" charset="0"/>
+              </a:rPr>
+              <a:t>Processing Pipeline 1: Pre-Feature Extraction</a:t>
+            </a:r>
+            <a:r>
+              <a:rPr lang="en-US" sz="4000" b="0" i="0" dirty="0">
+                <a:solidFill>
+                  <a:srgbClr val="000000"/>
+                </a:solidFill>
+                <a:effectLst/>
+                <a:latin typeface="Segoe UI" panose="020B0502040204020203" pitchFamily="34" charset="0"/>
+              </a:rPr>
+              <a:t>​</a:t>
+            </a:r>
+            <a:endParaRPr lang="en-US" sz="4000" b="1" dirty="0">
+              <a:latin typeface="Segoe "/>
+            </a:endParaRPr>
+          </a:p>
+        </p:txBody>
+      </p:sp>
+      <p:pic>
+        <p:nvPicPr>
+          <p:cNvPr id="4" name="Picture 3" descr="A screenshot of a computer&#10;&#10;Description automatically generated">
+            <a:extLst>
+              <a:ext uri="{FF2B5EF4-FFF2-40B4-BE49-F238E27FC236}">
+                <a16:creationId xmlns:a16="http://schemas.microsoft.com/office/drawing/2014/main" id="{D1B7ECFA-099C-480E-8984-A0574BD45384}"/>
+              </a:ext>
+            </a:extLst>
+          </p:cNvPr>
+          <p:cNvPicPr>
+            <a:picLocks noChangeAspect="1"/>
+          </p:cNvPicPr>
+          <p:nvPr/>
+        </p:nvPicPr>
+        <p:blipFill rotWithShape="1">
+          <a:blip r:embed="rId3">
+            <a:extLst>
+              <a:ext uri="{28A0092B-C50C-407E-A947-70E740481C1C}">
+                <a14:useLocalDpi xmlns:a14="http://schemas.microsoft.com/office/drawing/2010/main" val="0"/>
+              </a:ext>
+            </a:extLst>
+          </a:blip>
+          <a:srcRect l="8251" t="28889" r="20978" b="13015"/>
+          <a:stretch/>
+        </p:blipFill>
+        <p:spPr>
+          <a:xfrm>
+            <a:off x="613609" y="1436914"/>
+            <a:ext cx="7990114" cy="3984171"/>
+          </a:xfrm>
+          <a:prstGeom prst="rect">
+            <a:avLst/>
+          </a:prstGeom>
+        </p:spPr>
+      </p:pic>
+      <p:pic>
+        <p:nvPicPr>
+          <p:cNvPr id="25" name="Picture 24" descr="A picture containing chart&#10;&#10;Description automatically generated">
+            <a:extLst>
+              <a:ext uri="{FF2B5EF4-FFF2-40B4-BE49-F238E27FC236}">
+                <a16:creationId xmlns:a16="http://schemas.microsoft.com/office/drawing/2014/main" id="{D9B8D8CE-75E7-4091-8565-CEC190031175}"/>
+              </a:ext>
+            </a:extLst>
+          </p:cNvPr>
+          <p:cNvPicPr>
+            <a:picLocks noChangeAspect="1"/>
+          </p:cNvPicPr>
+          <p:nvPr/>
+        </p:nvPicPr>
+        <p:blipFill>
+          <a:blip r:embed="rId4">
+            <a:extLst>
+              <a:ext uri="{28A0092B-C50C-407E-A947-70E740481C1C}">
+                <a14:useLocalDpi xmlns:a14="http://schemas.microsoft.com/office/drawing/2010/main" val="0"/>
+              </a:ext>
+            </a:extLst>
+          </a:blip>
+          <a:stretch>
+            <a:fillRect/>
+          </a:stretch>
+        </p:blipFill>
+        <p:spPr>
+          <a:xfrm>
+            <a:off x="7580025" y="3847513"/>
+            <a:ext cx="4208021" cy="2645361"/>
+          </a:xfrm>
+          <a:prstGeom prst="rect">
+            <a:avLst/>
+          </a:prstGeom>
+        </p:spPr>
+      </p:pic>
+      <p:sp>
+        <p:nvSpPr>
+          <p:cNvPr id="5" name="TextBox 4">
+            <a:extLst>
+              <a:ext uri="{FF2B5EF4-FFF2-40B4-BE49-F238E27FC236}">
+                <a16:creationId xmlns:a16="http://schemas.microsoft.com/office/drawing/2014/main" id="{96AABC36-B977-4B80-911C-8EFBF5208DA2}"/>
+              </a:ext>
+            </a:extLst>
+          </p:cNvPr>
+          <p:cNvSpPr txBox="1"/>
+          <p:nvPr/>
+        </p:nvSpPr>
+        <p:spPr>
+          <a:xfrm>
+            <a:off x="116" y="6488668"/>
+            <a:ext cx="6273064" cy="369332"/>
+          </a:xfrm>
+          <a:prstGeom prst="rect">
+            <a:avLst/>
+          </a:prstGeom>
+          <a:noFill/>
+        </p:spPr>
+        <p:txBody>
+          <a:bodyPr wrap="none" rtlCol="0">
+            <a:spAutoFit/>
+          </a:bodyPr>
+          <a:lstStyle/>
+          <a:p>
+            <a:r>
+              <a:rPr lang="en-US" dirty="0"/>
+              <a:t>To plot all features on an image, those changed to binary images.</a:t>
+            </a:r>
+          </a:p>
+        </p:txBody>
+      </p:sp>
+      <p:sp>
+        <p:nvSpPr>
+          <p:cNvPr id="21" name="TextBox 20">
+            <a:extLst>
+              <a:ext uri="{FF2B5EF4-FFF2-40B4-BE49-F238E27FC236}">
+                <a16:creationId xmlns:a16="http://schemas.microsoft.com/office/drawing/2014/main" id="{C8DADA2C-D147-408C-891C-4629C5D6F157}"/>
+              </a:ext>
+            </a:extLst>
+          </p:cNvPr>
+          <p:cNvSpPr txBox="1"/>
+          <p:nvPr/>
+        </p:nvSpPr>
+        <p:spPr>
+          <a:xfrm>
+            <a:off x="8036378" y="3535680"/>
+            <a:ext cx="6123214" cy="369332"/>
+          </a:xfrm>
+          <a:prstGeom prst="rect">
+            <a:avLst/>
+          </a:prstGeom>
+          <a:noFill/>
+        </p:spPr>
+        <p:txBody>
+          <a:bodyPr wrap="square">
+            <a:spAutoFit/>
+          </a:bodyPr>
+          <a:lstStyle/>
+          <a:p>
+            <a:r>
+              <a:rPr lang="en-US" sz="1800" i="1" dirty="0">
+                <a:solidFill>
+                  <a:srgbClr val="000000"/>
+                </a:solidFill>
+                <a:latin typeface="Segoe "/>
+              </a:rPr>
+              <a:t>CD,       PTI,     </a:t>
+            </a:r>
+            <a:r>
+              <a:rPr lang="en-US" sz="1800" i="1" dirty="0" err="1">
+                <a:solidFill>
+                  <a:srgbClr val="000000"/>
+                </a:solidFill>
+                <a:latin typeface="Segoe "/>
+              </a:rPr>
+              <a:t>Tmax</a:t>
+            </a:r>
+            <a:r>
+              <a:rPr lang="en-US" sz="1800" i="1" dirty="0">
+                <a:solidFill>
+                  <a:srgbClr val="000000"/>
+                </a:solidFill>
+                <a:latin typeface="Segoe "/>
+              </a:rPr>
+              <a:t>,   </a:t>
+            </a:r>
+            <a:r>
+              <a:rPr lang="en-US" sz="1800" i="1" dirty="0" err="1">
+                <a:solidFill>
+                  <a:srgbClr val="000000"/>
+                </a:solidFill>
+                <a:latin typeface="Segoe "/>
+              </a:rPr>
+              <a:t>Tmin</a:t>
+            </a:r>
+            <a:r>
+              <a:rPr lang="en-US" sz="1800" i="1" dirty="0">
+                <a:solidFill>
+                  <a:srgbClr val="000000"/>
+                </a:solidFill>
+                <a:latin typeface="Segoe "/>
+              </a:rPr>
+              <a:t>,     P50, </a:t>
+            </a:r>
+            <a:endParaRPr lang="en-US" dirty="0"/>
+          </a:p>
+        </p:txBody>
+      </p:sp>
+      <p:sp>
+        <p:nvSpPr>
+          <p:cNvPr id="23" name="TextBox 22">
+            <a:extLst>
+              <a:ext uri="{FF2B5EF4-FFF2-40B4-BE49-F238E27FC236}">
+                <a16:creationId xmlns:a16="http://schemas.microsoft.com/office/drawing/2014/main" id="{3E44249B-F59C-49D5-8F08-11C1E1E19191}"/>
+              </a:ext>
+            </a:extLst>
+          </p:cNvPr>
+          <p:cNvSpPr txBox="1"/>
+          <p:nvPr/>
+        </p:nvSpPr>
+        <p:spPr>
+          <a:xfrm>
+            <a:off x="8036378" y="6435375"/>
+            <a:ext cx="7108902" cy="369332"/>
+          </a:xfrm>
+          <a:prstGeom prst="rect">
+            <a:avLst/>
+          </a:prstGeom>
+          <a:noFill/>
+        </p:spPr>
+        <p:txBody>
+          <a:bodyPr wrap="square">
+            <a:spAutoFit/>
+          </a:bodyPr>
+          <a:lstStyle/>
+          <a:p>
+            <a:r>
+              <a:rPr lang="en-US" sz="1800" i="1" dirty="0">
+                <a:solidFill>
+                  <a:srgbClr val="000000"/>
+                </a:solidFill>
+                <a:latin typeface="Segoe "/>
+              </a:rPr>
+              <a:t>P60,      P70,     P80,     P90,    P100</a:t>
+            </a:r>
+            <a:endParaRPr lang="en-US" dirty="0"/>
+          </a:p>
+        </p:txBody>
+      </p:sp>
+    </p:spTree>
+    <p:extLst>
+      <p:ext uri="{BB962C8B-B14F-4D97-AF65-F5344CB8AC3E}">
+        <p14:creationId xmlns:p14="http://schemas.microsoft.com/office/powerpoint/2010/main" val="2568335555"/>
+      </p:ext>
+    </p:extLst>
+  </p:cSld>
+  <p:clrMapOvr>
+    <a:masterClrMapping/>
+  </p:clrMapOvr>
+</p:sld>
+</file>
+
+<file path=ppt/slides/slide4.xml><?xml version="1.0" encoding="utf-8"?>
 <p:sld xmlns:a="http://schemas.openxmlformats.org/drawingml/2006/main" xmlns:r="http://schemas.openxmlformats.org/officeDocument/2006/relationships" xmlns:p="http://schemas.openxmlformats.org/presentationml/2006/main">
   <p:cSld>
     <p:spTree>
@@ -11121,7 +12549,19 @@
               <a:rPr lang="en-US" dirty="0">
                 <a:effectLst/>
               </a:rPr>
-              <a:t>: "efficientnet.EfficientNetB0", vgg16.VGG16, resnet50.ResNet50,</a:t>
+              <a:t>: EfficientNetB0, VGG16, ResNet50, </a:t>
+            </a:r>
+            <a:r>
+              <a:rPr lang="en-US" dirty="0" err="1">
+                <a:effectLst/>
+              </a:rPr>
+              <a:t>MobileNet</a:t>
+            </a:r>
+            <a:r>
+              <a:rPr lang="en-US" dirty="0">
+                <a:effectLst/>
+              </a:rPr>
+              <a:t>, InceptionV3</a:t>
             </a:r>
           </a:p>
           <a:p>
@@ -11286,7 +12726,7 @@
 </p:sld>
 </file>
 
-<file path=ppt/slides/slide4.xml><?xml version="1.0" encoding="utf-8"?>
+<file path=ppt/slides/slide5.xml><?xml version="1.0" encoding="utf-8"?>
 <p:sld xmlns:a="http://schemas.openxmlformats.org/drawingml/2006/main" xmlns:r="http://schemas.openxmlformats.org/officeDocument/2006/relationships" xmlns:p="http://schemas.openxmlformats.org/presentationml/2006/main">
   <p:cSld>
     <p:spTree>
@@ -11318,7 +12758,7 @@
         <p:spPr>
           <a:xfrm>
             <a:off x="6467788" y="3759071"/>
-            <a:ext cx="3535194" cy="1229069"/>
+            <a:ext cx="3535194" cy="2511100"/>
           </a:xfrm>
           <a:prstGeom prst="roundRect">
             <a:avLst/>
@@ -11870,13 +13310,13 @@
           <a:p>
             <a:pPr algn="ctr"/>
             <a:r>
-              <a:rPr lang="en-US" sz="1100" b="1">
+              <a:rPr lang="en-US" sz="1100" b="1" dirty="0">
                 <a:solidFill>
                   <a:schemeClr val="bg1"/>
                 </a:solidFill>
                 <a:latin typeface="Segoe "/>
               </a:rPr>
-              <a:t>Calculating Accuracy, F1-score, FRR and FAR</a:t>
+              <a:t>classifier</a:t>
             </a:r>
           </a:p>
         </p:txBody>
@@ -12567,6 +14007,105 @@
           </a:p>
         </p:txBody>
       </p:sp>
+      <p:sp>
+        <p:nvSpPr>
+          <p:cNvPr id="23" name="Rectangle: Rounded Corners 22">
+            <a:extLst>
+              <a:ext uri="{FF2B5EF4-FFF2-40B4-BE49-F238E27FC236}">
+                <a16:creationId xmlns:a16="http://schemas.microsoft.com/office/drawing/2014/main" id="{23F79E21-73E0-42A6-AC52-A527D550DF67}"/>
+              </a:ext>
+            </a:extLst>
+          </p:cNvPr>
+          <p:cNvSpPr/>
+          <p:nvPr/>
+        </p:nvSpPr>
+        <p:spPr>
+          <a:xfrm>
+            <a:off x="6632837" y="5320453"/>
+            <a:ext cx="3054460" cy="753691"/>
+          </a:xfrm>
+          <a:prstGeom prst="roundRect">
+            <a:avLst/>
+          </a:prstGeom>
+        </p:spPr>
+        <p:style>
+          <a:lnRef idx="2">
+            <a:schemeClr val="accent1">
+              <a:shade val="50000"/>
+            </a:schemeClr>
+          </a:lnRef>
+          <a:fillRef idx="1">
+            <a:schemeClr val="accent1"/>
+          </a:fillRef>
+          <a:effectRef idx="0">
+            <a:schemeClr val="accent1"/>
+          </a:effectRef>
+          <a:fontRef idx="minor">
+            <a:schemeClr val="lt1"/>
+          </a:fontRef>
+        </p:style>
+        <p:txBody>
+          <a:bodyPr rtlCol="0" anchor="ctr"/>
+          <a:lstStyle/>
+          <a:p>
+            <a:pPr algn="ctr"/>
+            <a:r>
+              <a:rPr lang="en-US" sz="1100" b="1">
+                <a:solidFill>
+                  <a:schemeClr val="bg1"/>
+                </a:solidFill>
+                <a:latin typeface="Segoe "/>
+              </a:rPr>
+              <a:t>Calculating Accuracy, F1-score, FRR and FAR</a:t>
+            </a:r>
+          </a:p>
+        </p:txBody>
+      </p:sp>
+      <p:cxnSp>
+        <p:nvCxnSpPr>
+          <p:cNvPr id="24" name="Connector: Elbow 23">
+            <a:extLst>
+              <a:ext uri="{FF2B5EF4-FFF2-40B4-BE49-F238E27FC236}">
+                <a16:creationId xmlns:a16="http://schemas.microsoft.com/office/drawing/2014/main" id="{5757A8ED-5F8E-42B5-A92D-8BD43A3714B3}"/>
+              </a:ext>
+            </a:extLst>
+          </p:cNvPr>
+          <p:cNvCxnSpPr>
+            <a:cxnSpLocks/>
+            <a:stCxn id="98" idx="2"/>
+            <a:endCxn id="23" idx="0"/>
+          </p:cNvCxnSpPr>
+          <p:nvPr/>
+        </p:nvCxnSpPr>
+        <p:spPr>
+          <a:xfrm rot="5400000">
+            <a:off x="7937599" y="5097984"/>
+            <a:ext cx="444937" cy="12700"/>
+          </a:xfrm>
+          <a:prstGeom prst="bentConnector3">
+            <a:avLst>
+              <a:gd name="adj1" fmla="val -38077"/>
+            </a:avLst>
+          </a:prstGeom>
+          <a:ln w="38100">
+            <a:tailEnd type="triangle"/>
+          </a:ln>
+        </p:spPr>
+        <p:style>
+          <a:lnRef idx="1">
+            <a:schemeClr val="accent1"/>
+          </a:lnRef>
+          <a:fillRef idx="0">
+            <a:schemeClr val="accent1"/>
+          </a:fillRef>
+          <a:effectRef idx="0">
+            <a:schemeClr val="accent1"/>
+          </a:effectRef>
+          <a:fontRef idx="minor">
+            <a:schemeClr val="tx1"/>
+          </a:fontRef>
+        </p:style>
+      </p:cxnSp>
     </p:spTree>
     <p:extLst>
       <p:ext uri="{BB962C8B-B14F-4D97-AF65-F5344CB8AC3E}">
@@ -12580,7 +14119,7 @@
 </p:sld>
 </file>
 
-<file path=ppt/slides/slide5.xml><?xml version="1.0" encoding="utf-8"?>
+<file path=ppt/slides/slide6.xml><?xml version="1.0" encoding="utf-8"?>
 <p:sld xmlns:a="http://schemas.openxmlformats.org/drawingml/2006/main" xmlns:r="http://schemas.openxmlformats.org/officeDocument/2006/relationships" xmlns:p="http://schemas.openxmlformats.org/presentationml/2006/main">
   <p:cSld>
     <p:spTree>
@@ -13911,10 +15450,10 @@
           <a:p>
             <a:pPr algn="ctr"/>
             <a:r>
-              <a:rPr lang="en-US" sz="1200" b="1">
+              <a:rPr lang="en-US" sz="1200" b="1" dirty="0">
                 <a:latin typeface="Segoe "/>
               </a:rPr>
-              <a:t>Computing the average of Accuracy, F1-score, FAR and FRR</a:t>
+              <a:t>Computing the average of Accuracy, F1-score</a:t>
             </a:r>
           </a:p>
         </p:txBody>
@@ -14007,10 +15546,10 @@
           <a:p>
             <a:pPr algn="ctr"/>
             <a:r>
-              <a:rPr lang="en-US" sz="1200" b="1">
+              <a:rPr lang="en-US" sz="1200" b="1" dirty="0">
                 <a:latin typeface="Segoe "/>
               </a:rPr>
-              <a:t>Calculating Accuracy, F1-score and EER</a:t>
+              <a:t>Calculating Accuracy, F1-score</a:t>
             </a:r>
           </a:p>
         </p:txBody>
@@ -14028,7 +15567,7 @@
 </p:sld>
 </file>
 
-<file path=ppt/slides/slide6.xml><?xml version="1.0" encoding="utf-8"?>
+<file path=ppt/slides/slide7.xml><?xml version="1.0" encoding="utf-8"?>
 <p:sld xmlns:a="http://schemas.openxmlformats.org/drawingml/2006/main" xmlns:r="http://schemas.openxmlformats.org/officeDocument/2006/relationships" xmlns:p="http://schemas.openxmlformats.org/presentationml/2006/main">
   <p:cSld>
     <p:spTree>
@@ -14350,7 +15889,7 @@
           <p:nvPr>
             <p:extLst>
               <p:ext uri="{D42A27DB-BD31-4B8C-83A1-F6EECF244321}">
-                <p14:modId xmlns:p14="http://schemas.microsoft.com/office/powerpoint/2010/main" val="332660073"/>
+                <p14:modId xmlns:p14="http://schemas.microsoft.com/office/powerpoint/2010/main" val="3483870822"/>
               </p:ext>
             </p:extLst>
           </p:nvPr>
@@ -14378,178 +15917,6 @@
 </p:sld>
 </file>
 
-<file path=ppt/slides/slide7.xml><?xml version="1.0" encoding="utf-8"?>
-<p:sld xmlns:a="http://schemas.openxmlformats.org/drawingml/2006/main" xmlns:r="http://schemas.openxmlformats.org/officeDocument/2006/relationships" xmlns:p="http://schemas.openxmlformats.org/presentationml/2006/main">
-  <p:cSld>
-    <p:spTree>
-      <p:nvGrpSpPr>
-        <p:cNvPr id="1" name=""/>
-        <p:cNvGrpSpPr/>
-        <p:nvPr/>
-      </p:nvGrpSpPr>
-      <p:grpSpPr>
-        <a:xfrm>
-          <a:off x="0" y="0"/>
-          <a:ext cx="0" cy="0"/>
-          <a:chOff x="0" y="0"/>
-          <a:chExt cx="0" cy="0"/>
-        </a:xfrm>
-      </p:grpSpPr>
-      <p:sp>
-        <p:nvSpPr>
-          <p:cNvPr id="4" name="Title 3">
-            <a:extLst>
-              <a:ext uri="{FF2B5EF4-FFF2-40B4-BE49-F238E27FC236}">
-                <a16:creationId xmlns:a16="http://schemas.microsoft.com/office/drawing/2014/main" id="{65AF4CC0-ECF4-4FE1-B5A7-4F54A87D60EE}"/>
-              </a:ext>
-            </a:extLst>
-          </p:cNvPr>
-          <p:cNvSpPr>
-            <a:spLocks noGrp="1"/>
-          </p:cNvSpPr>
-          <p:nvPr>
-            <p:ph type="title"/>
-          </p:nvPr>
-        </p:nvSpPr>
-        <p:spPr>
-          <a:xfrm>
-            <a:off x="838200" y="-142875"/>
-            <a:ext cx="10515600" cy="1325563"/>
-          </a:xfrm>
-        </p:spPr>
-        <p:txBody>
-          <a:bodyPr/>
-          <a:lstStyle/>
-          <a:p>
-            <a:r>
-              <a:rPr lang="en-US" b="1" dirty="0">
-                <a:latin typeface="Segoe "/>
-              </a:rPr>
-              <a:t>Deep features</a:t>
-            </a:r>
-          </a:p>
-        </p:txBody>
-      </p:sp>
-      <p:sp>
-        <p:nvSpPr>
-          <p:cNvPr id="3" name="TextBox 2">
-            <a:extLst>
-              <a:ext uri="{FF2B5EF4-FFF2-40B4-BE49-F238E27FC236}">
-                <a16:creationId xmlns:a16="http://schemas.microsoft.com/office/drawing/2014/main" id="{9F006398-122C-4948-A849-C986999B3E10}"/>
-              </a:ext>
-            </a:extLst>
-          </p:cNvPr>
-          <p:cNvSpPr txBox="1"/>
-          <p:nvPr/>
-        </p:nvSpPr>
-        <p:spPr>
-          <a:xfrm>
-            <a:off x="1815462" y="3903417"/>
-            <a:ext cx="3074675" cy="1323439"/>
-          </a:xfrm>
-          <a:prstGeom prst="rect">
-            <a:avLst/>
-          </a:prstGeom>
-          <a:noFill/>
-        </p:spPr>
-        <p:txBody>
-          <a:bodyPr wrap="square" lIns="91440" tIns="45720" rIns="91440" bIns="45720" anchor="t">
-            <a:spAutoFit/>
-          </a:bodyPr>
-          <a:lstStyle/>
-          <a:p>
-            <a:r>
-              <a:rPr lang="en-US" sz="1600" i="1" dirty="0"/>
-              <a:t>Statistical test: Mann-Whitney</a:t>
-            </a:r>
-          </a:p>
-          <a:p>
-            <a:r>
-              <a:rPr lang="en-US" sz="1600" dirty="0">
-                <a:ea typeface="+mn-lt"/>
-                <a:cs typeface="+mn-lt"/>
-              </a:rPr>
-              <a:t>p-value annotation legend:</a:t>
-            </a:r>
-          </a:p>
-          <a:p>
-            <a:r>
-              <a:rPr lang="en-US" sz="1600" dirty="0">
-                <a:ea typeface="+mn-lt"/>
-                <a:cs typeface="+mn-lt"/>
-              </a:rPr>
-              <a:t>ns: 5.00e-02 &lt; p &lt;= 1.00e+00</a:t>
-            </a:r>
-          </a:p>
-          <a:p>
-            <a:r>
-              <a:rPr lang="en-US" sz="1600" dirty="0">
-                <a:ea typeface="+mn-lt"/>
-                <a:cs typeface="+mn-lt"/>
-              </a:rPr>
-              <a:t>*: 1.00e-02 &lt; p &lt;= 5.00e-02</a:t>
-            </a:r>
-          </a:p>
-          <a:p>
-            <a:r>
-              <a:rPr lang="en-US" sz="1600" dirty="0">
-                <a:ea typeface="+mn-lt"/>
-                <a:cs typeface="+mn-lt"/>
-              </a:rPr>
-              <a:t>****: p &lt;= 1.00e-04</a:t>
-            </a:r>
-          </a:p>
-        </p:txBody>
-      </p:sp>
-      <p:pic>
-        <p:nvPicPr>
-          <p:cNvPr id="7" name="Picture 6" descr="Chart, box and whisker chart&#10;&#10;Description automatically generated">
-            <a:extLst>
-              <a:ext uri="{FF2B5EF4-FFF2-40B4-BE49-F238E27FC236}">
-                <a16:creationId xmlns:a16="http://schemas.microsoft.com/office/drawing/2014/main" id="{BC654F08-5B6A-4D6B-A9AE-F68F3303698A}"/>
-              </a:ext>
-            </a:extLst>
-          </p:cNvPr>
-          <p:cNvPicPr>
-            <a:picLocks noChangeAspect="1"/>
-          </p:cNvPicPr>
-          <p:nvPr/>
-        </p:nvPicPr>
-        <p:blipFill>
-          <a:blip r:embed="rId3">
-            <a:extLst>
-              <a:ext uri="{28A0092B-C50C-407E-A947-70E740481C1C}">
-                <a14:useLocalDpi xmlns:a14="http://schemas.microsoft.com/office/drawing/2010/main" val="0"/>
-              </a:ext>
-            </a:extLst>
-          </a:blip>
-          <a:stretch>
-            <a:fillRect/>
-          </a:stretch>
-        </p:blipFill>
-        <p:spPr>
-          <a:xfrm>
-            <a:off x="5867399" y="228113"/>
-            <a:ext cx="4960257" cy="6629887"/>
-          </a:xfrm>
-          <a:prstGeom prst="rect">
-            <a:avLst/>
-          </a:prstGeom>
-        </p:spPr>
-      </p:pic>
-    </p:spTree>
-    <p:extLst>
-      <p:ext uri="{BB962C8B-B14F-4D97-AF65-F5344CB8AC3E}">
-        <p14:creationId xmlns:p14="http://schemas.microsoft.com/office/powerpoint/2010/main" val="1968424929"/>
-      </p:ext>
-    </p:extLst>
-  </p:cSld>
-  <p:clrMapOvr>
-    <a:masterClrMapping/>
-  </p:clrMapOvr>
-</p:sld>
-</file>
-
 <file path=ppt/slides/slide8.xml><?xml version="1.0" encoding="utf-8"?>
 <p:sld xmlns:a="http://schemas.openxmlformats.org/drawingml/2006/main" xmlns:r="http://schemas.openxmlformats.org/officeDocument/2006/relationships" xmlns:p="http://schemas.openxmlformats.org/presentationml/2006/main">
   <p:cSld>
@@ -14589,21 +15956,21 @@
           <a:lstStyle/>
           <a:p>
             <a:r>
-              <a:rPr lang="en-US" b="1">
+              <a:rPr lang="en-US" b="1" dirty="0">
                 <a:latin typeface="Segoe "/>
               </a:rPr>
-              <a:t>Principal Component Analysis (ROC)</a:t>
-            </a:r>
-            <a:endParaRPr lang="en-US"/>
+              <a:t>ResNet50</a:t>
+            </a:r>
+            <a:endParaRPr lang="en-US" dirty="0"/>
           </a:p>
         </p:txBody>
       </p:sp>
       <p:pic>
         <p:nvPicPr>
-          <p:cNvPr id="7" name="Picture 6">
-            <a:extLst>
-              <a:ext uri="{FF2B5EF4-FFF2-40B4-BE49-F238E27FC236}">
-                <a16:creationId xmlns:a16="http://schemas.microsoft.com/office/drawing/2014/main" id="{894FDFA9-914A-4815-8B07-257369AC3404}"/>
+          <p:cNvPr id="8" name="Picture 7" descr="Diagram&#10;&#10;Description automatically generated">
+            <a:extLst>
+              <a:ext uri="{FF2B5EF4-FFF2-40B4-BE49-F238E27FC236}">
+                <a16:creationId xmlns:a16="http://schemas.microsoft.com/office/drawing/2014/main" id="{B38860AD-4884-4542-9EA4-57B39B58C5AE}"/>
               </a:ext>
             </a:extLst>
           </p:cNvPr>
@@ -14620,67 +15987,55 @@
               </a:ext>
             </a:extLst>
           </a:blip>
-          <a:srcRect/>
-          <a:stretch/>
+          <a:stretch>
+            <a:fillRect/>
+          </a:stretch>
         </p:blipFill>
         <p:spPr>
           <a:xfrm>
-            <a:off x="1646321" y="1310988"/>
-            <a:ext cx="8899356" cy="5085347"/>
+            <a:off x="5853793" y="845683"/>
+            <a:ext cx="6210300" cy="5972175"/>
           </a:xfrm>
           <a:prstGeom prst="rect">
             <a:avLst/>
           </a:prstGeom>
         </p:spPr>
       </p:pic>
-      <p:sp>
-        <p:nvSpPr>
-          <p:cNvPr id="5" name="TextBox 4">
-            <a:extLst>
-              <a:ext uri="{FF2B5EF4-FFF2-40B4-BE49-F238E27FC236}">
-                <a16:creationId xmlns:a16="http://schemas.microsoft.com/office/drawing/2014/main" id="{109C5726-8DE5-4734-8CD5-A7B4C4DADEE1}"/>
-              </a:ext>
-            </a:extLst>
-          </p:cNvPr>
-          <p:cNvSpPr txBox="1"/>
+      <p:pic>
+        <p:nvPicPr>
+          <p:cNvPr id="10" name="Picture 9" descr="A screenshot of a computer&#10;&#10;Description automatically generated with medium confidence">
+            <a:extLst>
+              <a:ext uri="{FF2B5EF4-FFF2-40B4-BE49-F238E27FC236}">
+                <a16:creationId xmlns:a16="http://schemas.microsoft.com/office/drawing/2014/main" id="{70EE1221-1354-4E3A-B3DD-8F55E471B98B}"/>
+              </a:ext>
+            </a:extLst>
+          </p:cNvPr>
+          <p:cNvPicPr>
+            <a:picLocks noChangeAspect="1"/>
+          </p:cNvPicPr>
           <p:nvPr/>
-        </p:nvSpPr>
+        </p:nvPicPr>
+        <p:blipFill rotWithShape="1">
+          <a:blip r:embed="rId4">
+            <a:extLst>
+              <a:ext uri="{28A0092B-C50C-407E-A947-70E740481C1C}">
+                <a14:useLocalDpi xmlns:a14="http://schemas.microsoft.com/office/drawing/2010/main" val="0"/>
+              </a:ext>
+            </a:extLst>
+          </a:blip>
+          <a:srcRect l="26998" t="21156" r="37365" b="25511"/>
+          <a:stretch/>
+        </p:blipFill>
         <p:spPr>
           <a:xfrm>
-            <a:off x="-1425" y="6396335"/>
-            <a:ext cx="6097424" cy="461665"/>
+            <a:off x="658367" y="2087563"/>
+            <a:ext cx="4845843" cy="4405312"/>
           </a:xfrm>
           <a:prstGeom prst="rect">
             <a:avLst/>
           </a:prstGeom>
-          <a:noFill/>
         </p:spPr>
-        <p:txBody>
-          <a:bodyPr wrap="square">
-            <a:spAutoFit/>
-          </a:bodyPr>
-          <a:lstStyle/>
-          <a:p>
-            <a:pPr>
-              <a:spcBef>
-                <a:spcPts val="0"/>
-              </a:spcBef>
-              <a:spcAft>
-                <a:spcPts val="0"/>
-              </a:spcAft>
-            </a:pPr>
-            <a:r>
-              <a:rPr lang="en-US" sz="1200">
-                <a:solidFill>
-                  <a:srgbClr val="0E101A"/>
-                </a:solidFill>
-                <a:effectLst/>
-              </a:rPr>
-              <a:t>For each subject, two models were developed, left and right. As a result, we have 2*96 models, and these two plots are obtained from the average of FAR and FRR in these models.</a:t>
-            </a:r>
-          </a:p>
-        </p:txBody>
-      </p:sp>
+      </p:pic>
     </p:spTree>
     <p:extLst>
       <p:ext uri="{BB962C8B-B14F-4D97-AF65-F5344CB8AC3E}">
@@ -14711,6 +16066,41 @@
           <a:chExt cx="0" cy="0"/>
         </a:xfrm>
       </p:grpSpPr>
+      <p:pic>
+        <p:nvPicPr>
+          <p:cNvPr id="8" name="Picture 7">
+            <a:extLst>
+              <a:ext uri="{FF2B5EF4-FFF2-40B4-BE49-F238E27FC236}">
+                <a16:creationId xmlns:a16="http://schemas.microsoft.com/office/drawing/2014/main" id="{B38860AD-4884-4542-9EA4-57B39B58C5AE}"/>
+              </a:ext>
+            </a:extLst>
+          </p:cNvPr>
+          <p:cNvPicPr>
+            <a:picLocks noChangeAspect="1"/>
+          </p:cNvPicPr>
+          <p:nvPr/>
+        </p:nvPicPr>
+        <p:blipFill>
+          <a:blip r:embed="rId3">
+            <a:extLst>
+              <a:ext uri="{28A0092B-C50C-407E-A947-70E740481C1C}">
+                <a14:useLocalDpi xmlns:a14="http://schemas.microsoft.com/office/drawing/2010/main" val="0"/>
+              </a:ext>
+            </a:extLst>
+          </a:blip>
+          <a:srcRect/>
+          <a:stretch/>
+        </p:blipFill>
+        <p:spPr>
+          <a:xfrm>
+            <a:off x="5799364" y="836583"/>
+            <a:ext cx="6210300" cy="5794431"/>
+          </a:xfrm>
+          <a:prstGeom prst="rect">
+            <a:avLst/>
+          </a:prstGeom>
+        </p:spPr>
+      </p:pic>
       <p:sp>
         <p:nvSpPr>
           <p:cNvPr id="4" name="Title 3">
@@ -14729,405 +16119,25 @@
         </p:nvSpPr>
         <p:spPr/>
         <p:txBody>
-          <a:bodyPr>
-            <a:normAutofit/>
-          </a:bodyPr>
+          <a:bodyPr/>
           <a:lstStyle/>
           <a:p>
-            <a:pPr marL="0" marR="0" lvl="0" indent="0" algn="l" defTabSz="914400" rtl="0" eaLnBrk="1" fontAlgn="auto" latinLnBrk="0" hangingPunct="1">
-              <a:lnSpc>
-                <a:spcPct val="100000"/>
-              </a:lnSpc>
-              <a:spcBef>
-                <a:spcPts val="0"/>
-              </a:spcBef>
-              <a:spcAft>
-                <a:spcPts val="0"/>
-              </a:spcAft>
-              <a:buClrTx/>
-              <a:buSzTx/>
-              <a:buFontTx/>
-              <a:buNone/>
-              <a:tabLst/>
-              <a:defRPr/>
-            </a:pPr>
-            <a:r>
-              <a:rPr lang="en-US" sz="4000" b="1" i="0">
-                <a:effectLst/>
+            <a:r>
+              <a:rPr lang="en-US" b="1" dirty="0" err="1">
                 <a:latin typeface="Segoe "/>
               </a:rPr>
-              <a:t>Template Matching Criterion​</a:t>
-            </a:r>
-            <a:endParaRPr lang="en-US" sz="4000" b="1">
-              <a:latin typeface="Segoe "/>
-            </a:endParaRPr>
-          </a:p>
-        </p:txBody>
-      </p:sp>
-      <p:graphicFrame>
-        <p:nvGraphicFramePr>
-          <p:cNvPr id="5" name="Table 4">
-            <a:extLst>
-              <a:ext uri="{FF2B5EF4-FFF2-40B4-BE49-F238E27FC236}">
-                <a16:creationId xmlns:a16="http://schemas.microsoft.com/office/drawing/2014/main" id="{4FFE0A40-1BE8-4AA9-8732-27EA4F8BA01E}"/>
-              </a:ext>
-            </a:extLst>
-          </p:cNvPr>
-          <p:cNvGraphicFramePr>
-            <a:graphicFrameLocks noGrp="1"/>
-          </p:cNvGraphicFramePr>
-          <p:nvPr>
-            <p:extLst>
-              <p:ext uri="{D42A27DB-BD31-4B8C-83A1-F6EECF244321}">
-                <p14:modId xmlns:p14="http://schemas.microsoft.com/office/powerpoint/2010/main" val="4134242621"/>
-              </p:ext>
-            </p:extLst>
-          </p:nvPr>
-        </p:nvGraphicFramePr>
-        <p:xfrm>
-          <a:off x="7488381" y="5171958"/>
-          <a:ext cx="4564478" cy="1584960"/>
-        </p:xfrm>
-        <a:graphic>
-          <a:graphicData uri="http://schemas.openxmlformats.org/drawingml/2006/table">
-            <a:tbl>
-              <a:tblPr firstCol="1" bandRow="1">
-                <a:tableStyleId>{5C22544A-7EE6-4342-B048-85BDC9FD1C3A}</a:tableStyleId>
-              </a:tblPr>
-              <a:tblGrid>
-                <a:gridCol w="2194405">
-                  <a:extLst>
-                    <a:ext uri="{9D8B030D-6E8A-4147-A177-3AD203B41FA5}">
-                      <a16:colId xmlns:a16="http://schemas.microsoft.com/office/drawing/2014/main" val="2722018111"/>
-                    </a:ext>
-                  </a:extLst>
-                </a:gridCol>
-                <a:gridCol w="2370073">
-                  <a:extLst>
-                    <a:ext uri="{9D8B030D-6E8A-4147-A177-3AD203B41FA5}">
-                      <a16:colId xmlns:a16="http://schemas.microsoft.com/office/drawing/2014/main" val="1746409409"/>
-                    </a:ext>
-                  </a:extLst>
-                </a:gridCol>
-              </a:tblGrid>
-              <a:tr h="274320">
-                <a:tc>
-                  <a:txBody>
-                    <a:bodyPr/>
-                    <a:lstStyle/>
-                    <a:p>
-                      <a:pPr marL="0" marR="0" lvl="0" indent="0" algn="l" defTabSz="914400" rtl="0" eaLnBrk="1" fontAlgn="auto" latinLnBrk="0" hangingPunct="1">
-                        <a:lnSpc>
-                          <a:spcPct val="100000"/>
-                        </a:lnSpc>
-                        <a:spcBef>
-                          <a:spcPts val="0"/>
-                        </a:spcBef>
-                        <a:spcAft>
-                          <a:spcPts val="0"/>
-                        </a:spcAft>
-                        <a:buClrTx/>
-                        <a:buSzTx/>
-                        <a:buFontTx/>
-                        <a:buNone/>
-                        <a:tabLst/>
-                        <a:defRPr/>
-                      </a:pPr>
-                      <a:r>
-                        <a:rPr lang="en-US" sz="1100" b="1">
-                          <a:latin typeface="Segoe "/>
-                        </a:rPr>
-                        <a:t>Features Type</a:t>
-                      </a:r>
-                    </a:p>
-                  </a:txBody>
-                  <a:tcPr/>
-                </a:tc>
-                <a:tc>
-                  <a:txBody>
-                    <a:bodyPr/>
-                    <a:lstStyle/>
-                    <a:p>
-                      <a:r>
-                        <a:rPr lang="en-US" sz="1100" b="1">
-                          <a:latin typeface="Segoe "/>
-                        </a:rPr>
-                        <a:t>COP features</a:t>
-                      </a:r>
-                    </a:p>
-                  </a:txBody>
-                  <a:tcPr/>
-                </a:tc>
-                <a:extLst>
-                  <a:ext uri="{0D108BD9-81ED-4DB2-BD59-A6C34878D82A}">
-                    <a16:rowId xmlns:a16="http://schemas.microsoft.com/office/drawing/2014/main" val="2874110073"/>
-                  </a:ext>
-                </a:extLst>
-              </a:tr>
-              <a:tr h="274320">
-                <a:tc>
-                  <a:txBody>
-                    <a:bodyPr/>
-                    <a:lstStyle/>
-                    <a:p>
-                      <a:pPr marL="0" marR="0" lvl="0" indent="0" algn="l" defTabSz="914400" rtl="0" eaLnBrk="1" fontAlgn="auto" latinLnBrk="0" hangingPunct="1">
-                        <a:lnSpc>
-                          <a:spcPct val="100000"/>
-                        </a:lnSpc>
-                        <a:spcBef>
-                          <a:spcPts val="0"/>
-                        </a:spcBef>
-                        <a:spcAft>
-                          <a:spcPts val="0"/>
-                        </a:spcAft>
-                        <a:buClrTx/>
-                        <a:buSzTx/>
-                        <a:buFontTx/>
-                        <a:buNone/>
-                        <a:tabLst/>
-                        <a:defRPr/>
-                      </a:pPr>
-                      <a:r>
-                        <a:rPr lang="en-US" sz="1100" b="1">
-                          <a:latin typeface="Segoe "/>
-                        </a:rPr>
-                        <a:t>Normalization algorithm</a:t>
-                      </a:r>
-                    </a:p>
-                  </a:txBody>
-                  <a:tcPr/>
-                </a:tc>
-                <a:tc>
-                  <a:txBody>
-                    <a:bodyPr/>
-                    <a:lstStyle/>
-                    <a:p>
-                      <a:r>
-                        <a:rPr lang="en-US" sz="1100" b="1">
-                          <a:latin typeface="Segoe "/>
-                        </a:rPr>
-                        <a:t>Z-score, Min-Max</a:t>
-                      </a:r>
-                    </a:p>
-                  </a:txBody>
-                  <a:tcPr/>
-                </a:tc>
-                <a:extLst>
-                  <a:ext uri="{0D108BD9-81ED-4DB2-BD59-A6C34878D82A}">
-                    <a16:rowId xmlns:a16="http://schemas.microsoft.com/office/drawing/2014/main" val="778464140"/>
-                  </a:ext>
-                </a:extLst>
-              </a:tr>
-              <a:tr h="274320">
-                <a:tc>
-                  <a:txBody>
-                    <a:bodyPr/>
-                    <a:lstStyle/>
-                    <a:p>
-                      <a:pPr marL="0" marR="0" lvl="0" indent="0" algn="l" defTabSz="914400" rtl="0" eaLnBrk="1" fontAlgn="auto" latinLnBrk="0" hangingPunct="1">
-                        <a:lnSpc>
-                          <a:spcPct val="100000"/>
-                        </a:lnSpc>
-                        <a:spcBef>
-                          <a:spcPts val="0"/>
-                        </a:spcBef>
-                        <a:spcAft>
-                          <a:spcPts val="0"/>
-                        </a:spcAft>
-                        <a:buClrTx/>
-                        <a:buSzTx/>
-                        <a:buFontTx/>
-                        <a:buNone/>
-                        <a:tabLst/>
-                        <a:defRPr/>
-                      </a:pPr>
-                      <a:r>
-                        <a:rPr lang="en-US" sz="1100" b="1">
-                          <a:latin typeface="Segoe "/>
-                        </a:rPr>
-                        <a:t>Score matrix</a:t>
-                      </a:r>
-                    </a:p>
-                  </a:txBody>
-                  <a:tcPr/>
-                </a:tc>
-                <a:tc>
-                  <a:txBody>
-                    <a:bodyPr/>
-                    <a:lstStyle/>
-                    <a:p>
-                      <a:pPr marL="0" marR="0" lvl="0" indent="0" algn="l" defTabSz="914400" rtl="0" eaLnBrk="1" fontAlgn="auto" latinLnBrk="0" hangingPunct="1">
-                        <a:lnSpc>
-                          <a:spcPct val="100000"/>
-                        </a:lnSpc>
-                        <a:spcBef>
-                          <a:spcPts val="0"/>
-                        </a:spcBef>
-                        <a:spcAft>
-                          <a:spcPts val="0"/>
-                        </a:spcAft>
-                        <a:buClrTx/>
-                        <a:buSzTx/>
-                        <a:buFontTx/>
-                        <a:buNone/>
-                        <a:tabLst/>
-                        <a:defRPr/>
-                      </a:pPr>
-                      <a:r>
-                        <a:rPr lang="en-US" sz="1100" b="1">
-                          <a:latin typeface="Segoe "/>
-                        </a:rPr>
-                        <a:t>Distance</a:t>
-                      </a:r>
-                    </a:p>
-                  </a:txBody>
-                  <a:tcPr/>
-                </a:tc>
-                <a:extLst>
-                  <a:ext uri="{0D108BD9-81ED-4DB2-BD59-A6C34878D82A}">
-                    <a16:rowId xmlns:a16="http://schemas.microsoft.com/office/drawing/2014/main" val="3291262781"/>
-                  </a:ext>
-                </a:extLst>
-              </a:tr>
-              <a:tr h="274320">
-                <a:tc>
-                  <a:txBody>
-                    <a:bodyPr/>
-                    <a:lstStyle/>
-                    <a:p>
-                      <a:r>
-                        <a:rPr lang="en-US" sz="1100" b="1">
-                          <a:latin typeface="Segoe "/>
-                        </a:rPr>
-                        <a:t>PCA</a:t>
-                      </a:r>
-                    </a:p>
-                  </a:txBody>
-                  <a:tcPr/>
-                </a:tc>
-                <a:tc>
-                  <a:txBody>
-                    <a:bodyPr/>
-                    <a:lstStyle/>
-                    <a:p>
-                      <a:pPr marL="0" marR="0" lvl="0" indent="0" algn="l" defTabSz="914400" rtl="0" eaLnBrk="1" fontAlgn="auto" latinLnBrk="0" hangingPunct="1">
-                        <a:lnSpc>
-                          <a:spcPct val="100000"/>
-                        </a:lnSpc>
-                        <a:spcBef>
-                          <a:spcPts val="0"/>
-                        </a:spcBef>
-                        <a:spcAft>
-                          <a:spcPts val="0"/>
-                        </a:spcAft>
-                        <a:buClrTx/>
-                        <a:buSzTx/>
-                        <a:buFontTx/>
-                        <a:buNone/>
-                        <a:tabLst/>
-                        <a:defRPr/>
-                      </a:pPr>
-                      <a:r>
-                        <a:rPr lang="en-US" sz="1100" b="1">
-                          <a:latin typeface="Segoe "/>
-                        </a:rPr>
-                        <a:t>Without PCA, </a:t>
-                      </a:r>
-                    </a:p>
-                    <a:p>
-                      <a:pPr marL="0" marR="0" lvl="0" indent="0" algn="l" defTabSz="914400" rtl="0" eaLnBrk="1" fontAlgn="auto" latinLnBrk="0" hangingPunct="1">
-                        <a:lnSpc>
-                          <a:spcPct val="100000"/>
-                        </a:lnSpc>
-                        <a:spcBef>
-                          <a:spcPts val="0"/>
-                        </a:spcBef>
-                        <a:spcAft>
-                          <a:spcPts val="0"/>
-                        </a:spcAft>
-                        <a:buClrTx/>
-                        <a:buSzTx/>
-                        <a:buFontTx/>
-                        <a:buNone/>
-                        <a:tabLst/>
-                        <a:defRPr/>
-                      </a:pPr>
-                      <a:r>
-                        <a:rPr lang="en-US" sz="1100" b="1">
-                          <a:latin typeface="Segoe "/>
-                        </a:rPr>
-                        <a:t>Keeping 95% variance, </a:t>
-                      </a:r>
-                    </a:p>
-                    <a:p>
-                      <a:pPr marL="0" marR="0" lvl="0" indent="0" algn="l" defTabSz="914400" rtl="0" eaLnBrk="1" fontAlgn="auto" latinLnBrk="0" hangingPunct="1">
-                        <a:lnSpc>
-                          <a:spcPct val="100000"/>
-                        </a:lnSpc>
-                        <a:spcBef>
-                          <a:spcPts val="0"/>
-                        </a:spcBef>
-                        <a:spcAft>
-                          <a:spcPts val="0"/>
-                        </a:spcAft>
-                        <a:buClrTx/>
-                        <a:buSzTx/>
-                        <a:buFontTx/>
-                        <a:buNone/>
-                        <a:tabLst/>
-                        <a:defRPr/>
-                      </a:pPr>
-                      <a:r>
-                        <a:rPr lang="en-US" sz="1100" b="1">
-                          <a:latin typeface="Segoe "/>
-                        </a:rPr>
-                        <a:t>Keeping 90% variance, </a:t>
-                      </a:r>
-                    </a:p>
-                    <a:p>
-                      <a:pPr marL="0" marR="0" lvl="0" indent="0" algn="l" defTabSz="914400" rtl="0" eaLnBrk="1" fontAlgn="auto" latinLnBrk="0" hangingPunct="1">
-                        <a:lnSpc>
-                          <a:spcPct val="100000"/>
-                        </a:lnSpc>
-                        <a:spcBef>
-                          <a:spcPts val="0"/>
-                        </a:spcBef>
-                        <a:spcAft>
-                          <a:spcPts val="0"/>
-                        </a:spcAft>
-                        <a:buClrTx/>
-                        <a:buSzTx/>
-                        <a:buFontTx/>
-                        <a:buNone/>
-                        <a:tabLst/>
-                        <a:defRPr/>
-                      </a:pPr>
-                      <a:r>
-                        <a:rPr lang="en-US" sz="1100" b="1">
-                          <a:latin typeface="Segoe "/>
-                        </a:rPr>
-                        <a:t>Keeping 80% variance</a:t>
-                      </a:r>
-                    </a:p>
-                  </a:txBody>
-                  <a:tcPr/>
-                </a:tc>
-                <a:extLst>
-                  <a:ext uri="{0D108BD9-81ED-4DB2-BD59-A6C34878D82A}">
-                    <a16:rowId xmlns:a16="http://schemas.microsoft.com/office/drawing/2014/main" val="701297346"/>
-                  </a:ext>
-                </a:extLst>
-              </a:tr>
-            </a:tbl>
-          </a:graphicData>
-        </a:graphic>
-      </p:graphicFrame>
+              <a:t>Mobilenet</a:t>
+            </a:r>
+            <a:endParaRPr lang="en-US" dirty="0"/>
+          </a:p>
+        </p:txBody>
+      </p:sp>
       <p:pic>
         <p:nvPicPr>
-          <p:cNvPr id="7" name="Picture 6" descr="Chart, box and whisker chart&#10;&#10;Description automatically generated">
-            <a:extLst>
-              <a:ext uri="{FF2B5EF4-FFF2-40B4-BE49-F238E27FC236}">
-                <a16:creationId xmlns:a16="http://schemas.microsoft.com/office/drawing/2014/main" id="{6AEEE05A-4AA8-4FAF-90FC-68A0370ABBE0}"/>
+          <p:cNvPr id="6" name="Picture 5" descr="Text&#10;&#10;Description automatically generated">
+            <a:extLst>
+              <a:ext uri="{FF2B5EF4-FFF2-40B4-BE49-F238E27FC236}">
+                <a16:creationId xmlns:a16="http://schemas.microsoft.com/office/drawing/2014/main" id="{CFB13B69-7830-4E43-8392-1738D51D26F8}"/>
               </a:ext>
             </a:extLst>
           </p:cNvPr>
@@ -15136,85 +16146,31 @@
           </p:cNvPicPr>
           <p:nvPr/>
         </p:nvPicPr>
-        <p:blipFill>
-          <a:blip r:embed="rId3"/>
-          <a:stretch>
-            <a:fillRect/>
-          </a:stretch>
+        <p:blipFill rotWithShape="1">
+          <a:blip r:embed="rId4">
+            <a:extLst>
+              <a:ext uri="{28A0092B-C50C-407E-A947-70E740481C1C}">
+                <a14:useLocalDpi xmlns:a14="http://schemas.microsoft.com/office/drawing/2010/main" val="0"/>
+              </a:ext>
+            </a:extLst>
+          </a:blip>
+          <a:srcRect l="20881" t="30440" r="52146" b="33175"/>
+          <a:stretch/>
         </p:blipFill>
         <p:spPr>
           <a:xfrm>
-            <a:off x="838023" y="1544940"/>
-            <a:ext cx="5508811" cy="5315512"/>
+            <a:off x="631372" y="2261735"/>
+            <a:ext cx="4852019" cy="3975780"/>
           </a:xfrm>
           <a:prstGeom prst="rect">
             <a:avLst/>
           </a:prstGeom>
         </p:spPr>
       </p:pic>
-      <p:sp>
-        <p:nvSpPr>
-          <p:cNvPr id="2" name="TextBox 1">
-            <a:extLst>
-              <a:ext uri="{FF2B5EF4-FFF2-40B4-BE49-F238E27FC236}">
-                <a16:creationId xmlns:a16="http://schemas.microsoft.com/office/drawing/2014/main" id="{15C0143F-CF22-439B-BED4-94F8826ADE44}"/>
-              </a:ext>
-            </a:extLst>
-          </p:cNvPr>
-          <p:cNvSpPr txBox="1"/>
-          <p:nvPr/>
-        </p:nvSpPr>
-        <p:spPr>
-          <a:xfrm>
-            <a:off x="7422935" y="4274907"/>
-            <a:ext cx="3074675" cy="1077218"/>
-          </a:xfrm>
-          <a:prstGeom prst="rect">
-            <a:avLst/>
-          </a:prstGeom>
-          <a:noFill/>
-        </p:spPr>
-        <p:txBody>
-          <a:bodyPr wrap="square" lIns="91440" tIns="45720" rIns="91440" bIns="45720" anchor="t">
-            <a:spAutoFit/>
-          </a:bodyPr>
-          <a:lstStyle/>
-          <a:p>
-            <a:r>
-              <a:rPr lang="en-US" sz="1600" i="1"/>
-              <a:t>Statistical test: Mann-Whitney</a:t>
-            </a:r>
-          </a:p>
-          <a:p>
-            <a:r>
-              <a:rPr lang="en-US" sz="1600">
-                <a:ea typeface="+mn-lt"/>
-                <a:cs typeface="+mn-lt"/>
-              </a:rPr>
-              <a:t>**: 1.00e-03 &lt; p &lt;= 1.00e-02 </a:t>
-            </a:r>
-          </a:p>
-          <a:p>
-            <a:r>
-              <a:rPr lang="en-US" sz="1600">
-                <a:ea typeface="+mn-lt"/>
-                <a:cs typeface="+mn-lt"/>
-              </a:rPr>
-              <a:t>****: p &lt;= 1.00e-04</a:t>
-            </a:r>
-          </a:p>
-          <a:p>
-            <a:endParaRPr lang="en-US" sz="1600">
-              <a:ea typeface="+mn-lt"/>
-              <a:cs typeface="+mn-lt"/>
-            </a:endParaRPr>
-          </a:p>
-        </p:txBody>
-      </p:sp>
     </p:spTree>
     <p:extLst>
       <p:ext uri="{BB962C8B-B14F-4D97-AF65-F5344CB8AC3E}">
-        <p14:creationId xmlns:p14="http://schemas.microsoft.com/office/powerpoint/2010/main" val="2418884918"/>
+        <p14:creationId xmlns:p14="http://schemas.microsoft.com/office/powerpoint/2010/main" val="3542457215"/>
       </p:ext>
     </p:extLst>
   </p:cSld>
@@ -15815,12 +16771,9 @@
 </file>
 
 <file path=customXml/item1.xml><?xml version="1.0" encoding="utf-8"?>
-<?mso-contentType ?>
-<FormTemplates xmlns="http://schemas.microsoft.com/sharepoint/v3/contenttype/forms">
-  <Display>DocumentLibraryForm</Display>
-  <Edit>DocumentLibraryForm</Edit>
-  <New>DocumentLibraryForm</New>
-</FormTemplates>
+<p:properties xmlns:p="http://schemas.microsoft.com/office/2006/metadata/properties" xmlns:xsi="http://www.w3.org/2001/XMLSchema-instance" xmlns:pc="http://schemas.microsoft.com/office/infopath/2007/PartnerControls">
+  <documentManagement/>
+</p:properties>
 </file>
 
 <file path=customXml/item2.xml><?xml version="1.0" encoding="utf-8"?>
@@ -16053,15 +17006,27 @@
 </file>
 
 <file path=customXml/item3.xml><?xml version="1.0" encoding="utf-8"?>
-<p:properties xmlns:p="http://schemas.microsoft.com/office/2006/metadata/properties" xmlns:xsi="http://www.w3.org/2001/XMLSchema-instance" xmlns:pc="http://schemas.microsoft.com/office/infopath/2007/PartnerControls">
-  <documentManagement/>
-</p:properties>
+<?mso-contentType ?>
+<FormTemplates xmlns="http://schemas.microsoft.com/sharepoint/v3/contenttype/forms">
+  <Display>DocumentLibraryForm</Display>
+  <Edit>DocumentLibraryForm</Edit>
+  <New>DocumentLibraryForm</New>
+</FormTemplates>
 </file>
 
 <file path=customXml/itemProps1.xml><?xml version="1.0" encoding="utf-8"?>
-<ds:datastoreItem xmlns:ds="http://schemas.openxmlformats.org/officeDocument/2006/customXml" ds:itemID="{10F8A4D5-F92A-4B8C-9F36-E1F57EFF295C}">
+<ds:datastoreItem xmlns:ds="http://schemas.openxmlformats.org/officeDocument/2006/customXml" ds:itemID="{D47E73BC-BB07-4564-A274-AC4195AB0934}">
   <ds:schemaRefs>
-    <ds:schemaRef ds:uri="http://schemas.microsoft.com/sharepoint/v3/contenttype/forms"/>
+    <ds:schemaRef ds:uri="89bf9f63-f70b-4e0c-b04b-4a4ce3345efc"/>
+    <ds:schemaRef ds:uri="f2f9bdb1-d529-492c-a5b5-012d92c11175"/>
+    <ds:schemaRef ds:uri="http://purl.org/dc/dcmitype/"/>
+    <ds:schemaRef ds:uri="http://purl.org/dc/elements/1.1/"/>
+    <ds:schemaRef ds:uri="http://purl.org/dc/terms/"/>
+    <ds:schemaRef ds:uri="http://schemas.microsoft.com/office/2006/documentManagement/types"/>
+    <ds:schemaRef ds:uri="http://schemas.microsoft.com/office/2006/metadata/properties"/>
+    <ds:schemaRef ds:uri="http://schemas.microsoft.com/office/infopath/2007/PartnerControls"/>
+    <ds:schemaRef ds:uri="http://schemas.openxmlformats.org/package/2006/metadata/core-properties"/>
+    <ds:schemaRef ds:uri="http://www.w3.org/XML/1998/namespace"/>
   </ds:schemaRefs>
 </ds:datastoreItem>
 </file>
@@ -16086,18 +17051,9 @@
 </file>
 
 <file path=customXml/itemProps3.xml><?xml version="1.0" encoding="utf-8"?>
-<ds:datastoreItem xmlns:ds="http://schemas.openxmlformats.org/officeDocument/2006/customXml" ds:itemID="{D47E73BC-BB07-4564-A274-AC4195AB0934}">
+<ds:datastoreItem xmlns:ds="http://schemas.openxmlformats.org/officeDocument/2006/customXml" ds:itemID="{10F8A4D5-F92A-4B8C-9F36-E1F57EFF295C}">
   <ds:schemaRefs>
-    <ds:schemaRef ds:uri="89bf9f63-f70b-4e0c-b04b-4a4ce3345efc"/>
-    <ds:schemaRef ds:uri="f2f9bdb1-d529-492c-a5b5-012d92c11175"/>
-    <ds:schemaRef ds:uri="http://purl.org/dc/dcmitype/"/>
-    <ds:schemaRef ds:uri="http://purl.org/dc/elements/1.1/"/>
-    <ds:schemaRef ds:uri="http://purl.org/dc/terms/"/>
-    <ds:schemaRef ds:uri="http://schemas.microsoft.com/office/2006/documentManagement/types"/>
-    <ds:schemaRef ds:uri="http://schemas.microsoft.com/office/2006/metadata/properties"/>
-    <ds:schemaRef ds:uri="http://schemas.microsoft.com/office/infopath/2007/PartnerControls"/>
-    <ds:schemaRef ds:uri="http://schemas.openxmlformats.org/package/2006/metadata/core-properties"/>
-    <ds:schemaRef ds:uri="http://www.w3.org/XML/1998/namespace"/>
+    <ds:schemaRef ds:uri="http://schemas.microsoft.com/sharepoint/v3/contenttype/forms"/>
   </ds:schemaRefs>
 </ds:datastoreItem>
 </file>
</xml_diff>